<commit_message>
added grafana graph to prasentation #51
</commit_message>
<xml_diff>
--- a/Diplomarbeit/doc/Presentations/DA-Präsentation2024_Zweitpräsentation.pptx
+++ b/Diplomarbeit/doc/Presentations/DA-Präsentation2024_Zweitpräsentation.pptx
@@ -601,7 +601,7 @@
             <a:fld id="{4597EA2D-D11E-4F11-940E-96FC3DC86B48}" type="datetimeFigureOut">
               <a:rPr lang="de-DE" smtClean="0"/>
               <a:pPr/>
-              <a:t>16.10.2024</a:t>
+              <a:t>19.10.2024</a:t>
             </a:fld>
             <a:endParaRPr lang="de-AT"/>
           </a:p>
@@ -768,7 +768,7 @@
             <a:fld id="{25FA59D5-1C02-4780-AF81-09ADAD492357}" type="datetimeFigureOut">
               <a:rPr lang="de-AT" smtClean="0"/>
               <a:pPr/>
-              <a:t>16.10.2024</a:t>
+              <a:t>19.10.2024</a:t>
             </a:fld>
             <a:endParaRPr lang="de-AT"/>
           </a:p>
@@ -1703,6 +1703,118 @@
 </p:notes>
 </file>
 
+<file path=ppt/notesSlides/notesSlide8.xml><?xml version="1.0" encoding="utf-8"?>
+<p:notes xmlns:a="http://schemas.openxmlformats.org/drawingml/2006/main" xmlns:r="http://schemas.openxmlformats.org/officeDocument/2006/relationships" xmlns:p="http://schemas.openxmlformats.org/presentationml/2006/main">
+  <p:cSld>
+    <p:spTree>
+      <p:nvGrpSpPr>
+        <p:cNvPr id="1" name=""/>
+        <p:cNvGrpSpPr/>
+        <p:nvPr/>
+      </p:nvGrpSpPr>
+      <p:grpSpPr>
+        <a:xfrm>
+          <a:off x="0" y="0"/>
+          <a:ext cx="0" cy="0"/>
+          <a:chOff x="0" y="0"/>
+          <a:chExt cx="0" cy="0"/>
+        </a:xfrm>
+      </p:grpSpPr>
+      <p:sp>
+        <p:nvSpPr>
+          <p:cNvPr id="2" name="Folienbildplatzhalter 1"/>
+          <p:cNvSpPr>
+            <a:spLocks noGrp="1" noRot="1" noChangeAspect="1"/>
+          </p:cNvSpPr>
+          <p:nvPr>
+            <p:ph type="sldImg"/>
+          </p:nvPr>
+        </p:nvSpPr>
+        <p:spPr/>
+      </p:sp>
+      <p:sp>
+        <p:nvSpPr>
+          <p:cNvPr id="3" name="Notizenplatzhalter 2"/>
+          <p:cNvSpPr>
+            <a:spLocks noGrp="1"/>
+          </p:cNvSpPr>
+          <p:nvPr>
+            <p:ph type="body" idx="1"/>
+          </p:nvPr>
+        </p:nvSpPr>
+        <p:spPr/>
+        <p:txBody>
+          <a:bodyPr/>
+          <a:lstStyle/>
+          <a:p>
+            <a:r>
+              <a:rPr lang="en-GB" dirty="0"/>
+              <a:t>3</a:t>
+            </a:r>
+          </a:p>
+          <a:p>
+            <a:r>
+              <a:rPr lang="en-GB" dirty="0"/>
+              <a:t>8</a:t>
+            </a:r>
+          </a:p>
+          <a:p>
+            <a:r>
+              <a:rPr lang="en-GB" dirty="0"/>
+              <a:t>9</a:t>
+            </a:r>
+          </a:p>
+          <a:p>
+            <a:r>
+              <a:rPr lang="en-GB" dirty="0"/>
+              <a:t>12</a:t>
+            </a:r>
+          </a:p>
+          <a:p>
+            <a:r>
+              <a:rPr lang="en-GB" dirty="0"/>
+              <a:t>13</a:t>
+            </a:r>
+          </a:p>
+        </p:txBody>
+      </p:sp>
+      <p:sp>
+        <p:nvSpPr>
+          <p:cNvPr id="4" name="Foliennummernplatzhalter 3"/>
+          <p:cNvSpPr>
+            <a:spLocks noGrp="1"/>
+          </p:cNvSpPr>
+          <p:nvPr>
+            <p:ph type="sldNum" sz="quarter" idx="5"/>
+          </p:nvPr>
+        </p:nvSpPr>
+        <p:spPr/>
+        <p:txBody>
+          <a:bodyPr/>
+          <a:lstStyle/>
+          <a:p>
+            <a:fld id="{7AA6D168-C717-485B-B0C8-699ECBDF2CFF}" type="slidenum">
+              <a:rPr lang="de-AT" smtClean="0"/>
+              <a:pPr/>
+              <a:t>24</a:t>
+            </a:fld>
+            <a:endParaRPr lang="de-AT"/>
+          </a:p>
+        </p:txBody>
+      </p:sp>
+    </p:spTree>
+    <p:extLst>
+      <p:ext uri="{BB962C8B-B14F-4D97-AF65-F5344CB8AC3E}">
+        <p14:creationId xmlns:p14="http://schemas.microsoft.com/office/powerpoint/2010/main" val="1070406584"/>
+      </p:ext>
+    </p:extLst>
+  </p:cSld>
+  <p:clrMapOvr>
+    <a:masterClrMapping/>
+  </p:clrMapOvr>
+</p:notes>
+</file>
+
 <file path=ppt/slideLayouts/slideLayout1.xml><?xml version="1.0" encoding="utf-8"?>
 <p:sldLayout xmlns:a="http://schemas.openxmlformats.org/drawingml/2006/main" xmlns:r="http://schemas.openxmlformats.org/officeDocument/2006/relationships" xmlns:p="http://schemas.openxmlformats.org/presentationml/2006/main" preserve="1" userDrawn="1">
   <p:cSld name="Titelfolie">
@@ -1776,7 +1888,7 @@
           <a:p>
             <a:fld id="{903DBAB2-6CCA-40C7-8885-2C056A77E284}" type="datetime1">
               <a:rPr lang="de-AT" smtClean="0"/>
-              <a:t>16.10.2024</a:t>
+              <a:t>19.10.2024</a:t>
             </a:fld>
             <a:endParaRPr lang="de-AT"/>
           </a:p>
@@ -2131,7 +2243,7 @@
           <a:p>
             <a:fld id="{CFFB591F-AE7F-406B-977E-415D708CD05B}" type="datetime1">
               <a:rPr lang="de-AT" smtClean="0"/>
-              <a:t>16.10.2024</a:t>
+              <a:t>19.10.2024</a:t>
             </a:fld>
             <a:endParaRPr lang="de-AT"/>
           </a:p>
@@ -2611,7 +2723,7 @@
           <a:p>
             <a:fld id="{DDED4213-31A7-43A9-B381-650B72838F3D}" type="datetime1">
               <a:rPr lang="de-AT" smtClean="0"/>
-              <a:t>16.10.2024</a:t>
+              <a:t>19.10.2024</a:t>
             </a:fld>
             <a:endParaRPr lang="de-AT"/>
           </a:p>
@@ -3243,7 +3355,7 @@
           <a:p>
             <a:fld id="{73623C63-4118-48BA-956A-11DEEC1AA07D}" type="datetime1">
               <a:rPr lang="de-AT" smtClean="0"/>
-              <a:t>16.10.2024</a:t>
+              <a:t>19.10.2024</a:t>
             </a:fld>
             <a:endParaRPr lang="de-AT"/>
           </a:p>
@@ -3588,7 +3700,7 @@
           <a:p>
             <a:fld id="{D256D3EE-23A3-40C2-AAE3-0430D418E6CE}" type="datetime1">
               <a:rPr lang="de-AT" smtClean="0"/>
-              <a:t>16.10.2024</a:t>
+              <a:t>19.10.2024</a:t>
             </a:fld>
             <a:endParaRPr lang="de-AT"/>
           </a:p>
@@ -3784,7 +3896,7 @@
           <a:p>
             <a:fld id="{3FE2F795-10B4-41AA-AEDE-F815B308DCDB}" type="datetime1">
               <a:rPr lang="de-AT" smtClean="0"/>
-              <a:t>16.10.2024</a:t>
+              <a:t>19.10.2024</a:t>
             </a:fld>
             <a:endParaRPr lang="de-AT"/>
           </a:p>
@@ -4009,7 +4121,7 @@
           <a:p>
             <a:fld id="{03FB355E-663F-46F6-A58A-7E827B834F26}" type="datetime1">
               <a:rPr lang="de-AT" smtClean="0"/>
-              <a:t>16.10.2024</a:t>
+              <a:t>19.10.2024</a:t>
             </a:fld>
             <a:endParaRPr lang="de-AT"/>
           </a:p>
@@ -4516,7 +4628,7 @@
             <a:pPr algn="r"/>
             <a:fld id="{8EA2BAE2-6757-47A9-8E17-82B3704991C6}" type="datetime4">
               <a:rPr lang="de-AT" smtClean="0"/>
-              <a:t>16. Oktober 2024</a:t>
+              <a:t>19. Oktober 2024</a:t>
             </a:fld>
             <a:endParaRPr lang="de-AT" dirty="0"/>
           </a:p>
@@ -8950,6 +9062,36 @@
           </a:p>
         </p:txBody>
       </p:sp>
+      <p:pic>
+        <p:nvPicPr>
+          <p:cNvPr id="9" name="Grafik 8">
+            <a:extLst>
+              <a:ext uri="{FF2B5EF4-FFF2-40B4-BE49-F238E27FC236}">
+                <a16:creationId xmlns:a16="http://schemas.microsoft.com/office/drawing/2014/main" id="{7ACBC51B-F618-00C1-CF3B-55E6158EBA89}"/>
+              </a:ext>
+            </a:extLst>
+          </p:cNvPr>
+          <p:cNvPicPr>
+            <a:picLocks noChangeAspect="1"/>
+          </p:cNvPicPr>
+          <p:nvPr/>
+        </p:nvPicPr>
+        <p:blipFill>
+          <a:blip r:embed="rId2"/>
+          <a:stretch>
+            <a:fillRect/>
+          </a:stretch>
+        </p:blipFill>
+        <p:spPr>
+          <a:xfrm>
+            <a:off x="4760110" y="1691400"/>
+            <a:ext cx="6822290" cy="4113861"/>
+          </a:xfrm>
+          <a:prstGeom prst="rect">
+            <a:avLst/>
+          </a:prstGeom>
+        </p:spPr>
+      </p:pic>
     </p:spTree>
     <p:extLst>
       <p:ext uri="{BB962C8B-B14F-4D97-AF65-F5344CB8AC3E}">
@@ -9043,31 +9185,31 @@
           <a:p>
             <a:r>
               <a:rPr lang="de-DE" dirty="0"/>
-              <a:t>3. Gesundheit &amp; Wohlergehen</a:t>
+              <a:t>Gesundheit &amp; Wohlergehen</a:t>
             </a:r>
           </a:p>
           <a:p>
             <a:r>
               <a:rPr lang="de-DE" dirty="0"/>
-              <a:t>8. Menschenwürdige Arbeit &amp; Wirtschaftswachstum</a:t>
+              <a:t>Menschenwürdige Arbeit &amp; Wirtschaftswachstum</a:t>
             </a:r>
           </a:p>
           <a:p>
             <a:r>
               <a:rPr lang="de-DE" dirty="0"/>
-              <a:t>9. Industrie, Innovation &amp; Infrastruktur</a:t>
+              <a:t>Industrie, Innovation &amp; Infrastruktur</a:t>
             </a:r>
           </a:p>
           <a:p>
             <a:r>
               <a:rPr lang="de-DE" dirty="0"/>
-              <a:t>12. Nachhaltiger Konsum &amp; Produktion</a:t>
+              <a:t>Nachhaltiger Konsum &amp; Produktion</a:t>
             </a:r>
           </a:p>
           <a:p>
             <a:r>
               <a:rPr lang="de-DE" dirty="0"/>
-              <a:t>13. Klimaschutz</a:t>
+              <a:t>Klimaschutz</a:t>
             </a:r>
           </a:p>
         </p:txBody>
@@ -11280,13 +11422,13 @@
   <p:clrMapOvr>
     <a:masterClrMapping/>
   </p:clrMapOvr>
-  <mc:AlternateContent xmlns:mc="http://schemas.openxmlformats.org/markup-compatibility/2006">
-    <mc:Choice xmlns:p159="http://schemas.microsoft.com/office/powerpoint/2015/09/main" Requires="p159">
+  <mc:AlternateContent xmlns:mc="http://schemas.openxmlformats.org/markup-compatibility/2006" xmlns:p159="http://schemas.microsoft.com/office/powerpoint/2015/09/main">
+    <mc:Choice Requires="p159">
       <p:transition xmlns:p14="http://schemas.microsoft.com/office/powerpoint/2010/main" spd="slow" p14:dur="2000" advClick="0" advTm="4000">
         <p159:morph option="byObject"/>
       </p:transition>
     </mc:Choice>
-    <mc:Fallback>
+    <mc:Fallback xmlns="">
       <p:transition spd="slow" advClick="0" advTm="4000">
         <p:fade/>
       </p:transition>
@@ -13223,15 +13365,6 @@
 </file>
 
 <file path=customXml/item1.xml><?xml version="1.0" encoding="utf-8"?>
-<?mso-contentType ?>
-<FormTemplates xmlns="http://schemas.microsoft.com/sharepoint/v3/contenttype/forms">
-  <Display>DocumentLibraryForm</Display>
-  <Edit>DocumentLibraryForm</Edit>
-  <New>DocumentLibraryForm</New>
-</FormTemplates>
-</file>
-
-<file path=customXml/item2.xml><?xml version="1.0" encoding="utf-8"?>
 <ct:contentTypeSchema xmlns:ct="http://schemas.microsoft.com/office/2006/metadata/contentType" xmlns:ma="http://schemas.microsoft.com/office/2006/metadata/properties/metaAttributes" ct:_="" ma:_="" ma:contentTypeName="Dokument" ma:contentTypeID="0x010100AEC342486E2AC5419469D1A36EC3682B" ma:contentTypeVersion="4" ma:contentTypeDescription="Ein neues Dokument erstellen." ma:contentTypeScope="" ma:versionID="3fa14d8831e4b125e814b54aaa4122bb">
   <xsd:schema xmlns:xsd="http://www.w3.org/2001/XMLSchema" xmlns:xs="http://www.w3.org/2001/XMLSchema" xmlns:p="http://schemas.microsoft.com/office/2006/metadata/properties" xmlns:ns2="025117e9-99fa-48ff-aab4-bb37753ec9db" targetNamespace="http://schemas.microsoft.com/office/2006/metadata/properties" ma:root="true" ma:fieldsID="c273f986753a84b21935896d46e76ffa" ns2:_="">
     <xsd:import namespace="025117e9-99fa-48ff-aab4-bb37753ec9db"/>
@@ -13375,6 +13508,15 @@
 </ct:contentTypeSchema>
 </file>
 
+<file path=customXml/item2.xml><?xml version="1.0" encoding="utf-8"?>
+<?mso-contentType ?>
+<FormTemplates xmlns="http://schemas.microsoft.com/sharepoint/v3/contenttype/forms">
+  <Display>DocumentLibraryForm</Display>
+  <Edit>DocumentLibraryForm</Edit>
+  <New>DocumentLibraryForm</New>
+</FormTemplates>
+</file>
+
 <file path=customXml/item3.xml><?xml version="1.0" encoding="utf-8"?>
 <p:properties xmlns:p="http://schemas.microsoft.com/office/2006/metadata/properties" xmlns:xsi="http://www.w3.org/2001/XMLSchema-instance" xmlns:pc="http://schemas.microsoft.com/office/infopath/2007/PartnerControls">
   <documentManagement/>
@@ -13382,14 +13524,6 @@
 </file>
 
 <file path=customXml/itemProps1.xml><?xml version="1.0" encoding="utf-8"?>
-<ds:datastoreItem xmlns:ds="http://schemas.openxmlformats.org/officeDocument/2006/customXml" ds:itemID="{A62B322D-2084-418A-8960-B074ADC5B6DB}">
-  <ds:schemaRefs>
-    <ds:schemaRef ds:uri="http://schemas.microsoft.com/sharepoint/v3/contenttype/forms"/>
-  </ds:schemaRefs>
-</ds:datastoreItem>
-</file>
-
-<file path=customXml/itemProps2.xml><?xml version="1.0" encoding="utf-8"?>
 <ds:datastoreItem xmlns:ds="http://schemas.openxmlformats.org/officeDocument/2006/customXml" ds:itemID="{112BE4CD-0DD7-4283-8B22-B94F084D1F44}">
   <ds:schemaRefs>
     <ds:schemaRef ds:uri="025117e9-99fa-48ff-aab4-bb37753ec9db"/>
@@ -13403,6 +13537,14 @@
     <ds:schemaRef ds:uri="http://schemas.microsoft.com/office/infopath/2007/PartnerControls"/>
     <ds:schemaRef ds:uri="http://schemas.openxmlformats.org/package/2006/metadata/core-properties"/>
     <ds:schemaRef ds:uri="http://www.w3.org/2001/XMLSchema"/>
+  </ds:schemaRefs>
+</ds:datastoreItem>
+</file>
+
+<file path=customXml/itemProps2.xml><?xml version="1.0" encoding="utf-8"?>
+<ds:datastoreItem xmlns:ds="http://schemas.openxmlformats.org/officeDocument/2006/customXml" ds:itemID="{A62B322D-2084-418A-8960-B074ADC5B6DB}">
+  <ds:schemaRefs>
+    <ds:schemaRef ds:uri="http://schemas.microsoft.com/sharepoint/v3/contenttype/forms"/>
   </ds:schemaRefs>
 </ds:datastoreItem>
 </file>

</xml_diff>

<commit_message>
Added MQTT Functionality #37
</commit_message>
<xml_diff>
--- a/Diplomarbeit/doc/Presentations/DA-Präsentation2024_Zweitpräsentation.pptx
+++ b/Diplomarbeit/doc/Presentations/DA-Präsentation2024_Zweitpräsentation.pptx
@@ -601,7 +601,7 @@
             <a:fld id="{4597EA2D-D11E-4F11-940E-96FC3DC86B48}" type="datetimeFigureOut">
               <a:rPr lang="de-DE" smtClean="0"/>
               <a:pPr/>
-              <a:t>19.10.2024</a:t>
+              <a:t>20.10.2024</a:t>
             </a:fld>
             <a:endParaRPr lang="de-AT"/>
           </a:p>
@@ -768,7 +768,7 @@
             <a:fld id="{25FA59D5-1C02-4780-AF81-09ADAD492357}" type="datetimeFigureOut">
               <a:rPr lang="de-AT" smtClean="0"/>
               <a:pPr/>
-              <a:t>19.10.2024</a:t>
+              <a:t>20.10.2024</a:t>
             </a:fld>
             <a:endParaRPr lang="de-AT"/>
           </a:p>
@@ -1888,7 +1888,7 @@
           <a:p>
             <a:fld id="{903DBAB2-6CCA-40C7-8885-2C056A77E284}" type="datetime1">
               <a:rPr lang="de-AT" smtClean="0"/>
-              <a:t>19.10.2024</a:t>
+              <a:t>20.10.2024</a:t>
             </a:fld>
             <a:endParaRPr lang="de-AT"/>
           </a:p>
@@ -2243,7 +2243,7 @@
           <a:p>
             <a:fld id="{CFFB591F-AE7F-406B-977E-415D708CD05B}" type="datetime1">
               <a:rPr lang="de-AT" smtClean="0"/>
-              <a:t>19.10.2024</a:t>
+              <a:t>20.10.2024</a:t>
             </a:fld>
             <a:endParaRPr lang="de-AT"/>
           </a:p>
@@ -2723,7 +2723,7 @@
           <a:p>
             <a:fld id="{DDED4213-31A7-43A9-B381-650B72838F3D}" type="datetime1">
               <a:rPr lang="de-AT" smtClean="0"/>
-              <a:t>19.10.2024</a:t>
+              <a:t>20.10.2024</a:t>
             </a:fld>
             <a:endParaRPr lang="de-AT"/>
           </a:p>
@@ -3355,7 +3355,7 @@
           <a:p>
             <a:fld id="{73623C63-4118-48BA-956A-11DEEC1AA07D}" type="datetime1">
               <a:rPr lang="de-AT" smtClean="0"/>
-              <a:t>19.10.2024</a:t>
+              <a:t>20.10.2024</a:t>
             </a:fld>
             <a:endParaRPr lang="de-AT"/>
           </a:p>
@@ -3700,7 +3700,7 @@
           <a:p>
             <a:fld id="{D256D3EE-23A3-40C2-AAE3-0430D418E6CE}" type="datetime1">
               <a:rPr lang="de-AT" smtClean="0"/>
-              <a:t>19.10.2024</a:t>
+              <a:t>20.10.2024</a:t>
             </a:fld>
             <a:endParaRPr lang="de-AT"/>
           </a:p>
@@ -3896,7 +3896,7 @@
           <a:p>
             <a:fld id="{3FE2F795-10B4-41AA-AEDE-F815B308DCDB}" type="datetime1">
               <a:rPr lang="de-AT" smtClean="0"/>
-              <a:t>19.10.2024</a:t>
+              <a:t>20.10.2024</a:t>
             </a:fld>
             <a:endParaRPr lang="de-AT"/>
           </a:p>
@@ -4121,7 +4121,7 @@
           <a:p>
             <a:fld id="{03FB355E-663F-46F6-A58A-7E827B834F26}" type="datetime1">
               <a:rPr lang="de-AT" smtClean="0"/>
-              <a:t>19.10.2024</a:t>
+              <a:t>20.10.2024</a:t>
             </a:fld>
             <a:endParaRPr lang="de-AT"/>
           </a:p>
@@ -4628,7 +4628,7 @@
             <a:pPr algn="r"/>
             <a:fld id="{8EA2BAE2-6757-47A9-8E17-82B3704991C6}" type="datetime4">
               <a:rPr lang="de-AT" smtClean="0"/>
-              <a:t>19. Oktober 2024</a:t>
+              <a:t>20. Oktober 2024</a:t>
             </a:fld>
             <a:endParaRPr lang="de-AT" dirty="0"/>
           </a:p>
@@ -13509,18 +13509,18 @@
 </file>
 
 <file path=customXml/item2.xml><?xml version="1.0" encoding="utf-8"?>
+<p:properties xmlns:p="http://schemas.microsoft.com/office/2006/metadata/properties" xmlns:xsi="http://www.w3.org/2001/XMLSchema-instance" xmlns:pc="http://schemas.microsoft.com/office/infopath/2007/PartnerControls">
+  <documentManagement/>
+</p:properties>
+</file>
+
+<file path=customXml/item3.xml><?xml version="1.0" encoding="utf-8"?>
 <?mso-contentType ?>
 <FormTemplates xmlns="http://schemas.microsoft.com/sharepoint/v3/contenttype/forms">
   <Display>DocumentLibraryForm</Display>
   <Edit>DocumentLibraryForm</Edit>
   <New>DocumentLibraryForm</New>
 </FormTemplates>
-</file>
-
-<file path=customXml/item3.xml><?xml version="1.0" encoding="utf-8"?>
-<p:properties xmlns:p="http://schemas.microsoft.com/office/2006/metadata/properties" xmlns:xsi="http://www.w3.org/2001/XMLSchema-instance" xmlns:pc="http://schemas.microsoft.com/office/infopath/2007/PartnerControls">
-  <documentManagement/>
-</p:properties>
 </file>
 
 <file path=customXml/itemProps1.xml><?xml version="1.0" encoding="utf-8"?>
@@ -13542,14 +13542,6 @@
 </file>
 
 <file path=customXml/itemProps2.xml><?xml version="1.0" encoding="utf-8"?>
-<ds:datastoreItem xmlns:ds="http://schemas.openxmlformats.org/officeDocument/2006/customXml" ds:itemID="{A62B322D-2084-418A-8960-B074ADC5B6DB}">
-  <ds:schemaRefs>
-    <ds:schemaRef ds:uri="http://schemas.microsoft.com/sharepoint/v3/contenttype/forms"/>
-  </ds:schemaRefs>
-</ds:datastoreItem>
-</file>
-
-<file path=customXml/itemProps3.xml><?xml version="1.0" encoding="utf-8"?>
 <ds:datastoreItem xmlns:ds="http://schemas.openxmlformats.org/officeDocument/2006/customXml" ds:itemID="{91B09AE3-FA1D-40C8-A6CE-A2D9F55131C8}">
   <ds:schemaRefs>
     <ds:schemaRef ds:uri="http://schemas.microsoft.com/office/2006/metadata/properties"/>
@@ -13563,4 +13555,12 @@
     <ds:schemaRef ds:uri="025117e9-99fa-48ff-aab4-bb37753ec9db"/>
   </ds:schemaRefs>
 </ds:datastoreItem>
+</file>
+
+<file path=customXml/itemProps3.xml><?xml version="1.0" encoding="utf-8"?>
+<ds:datastoreItem xmlns:ds="http://schemas.openxmlformats.org/officeDocument/2006/customXml" ds:itemID="{A62B322D-2084-418A-8960-B074ADC5B6DB}">
+  <ds:schemaRefs>
+    <ds:schemaRef ds:uri="http://schemas.microsoft.com/sharepoint/v3/contenttype/forms"/>
+  </ds:schemaRefs>
+</ds:datastoreItem>
 </file>
</xml_diff>

<commit_message>
Added Photo to Presentation
</commit_message>
<xml_diff>
--- a/Diplomarbeit/doc/Presentations/DA-Präsentation2024_Zweitpräsentation.pptx
+++ b/Diplomarbeit/doc/Presentations/DA-Präsentation2024_Zweitpräsentation.pptx
@@ -8880,6 +8880,41 @@
           </a:p>
         </p:txBody>
       </p:sp>
+      <p:pic>
+        <p:nvPicPr>
+          <p:cNvPr id="8" name="Grafik 7" descr="Ein Bild, das Elektrisches Bauelement, Elektronisches Bauteil, Elektronik, passives Bauelement enthält.&#10;&#10;Automatisch generierte Beschreibung">
+            <a:extLst>
+              <a:ext uri="{FF2B5EF4-FFF2-40B4-BE49-F238E27FC236}">
+                <a16:creationId xmlns:a16="http://schemas.microsoft.com/office/drawing/2014/main" id="{9CB9F298-EBC3-3EAD-641E-F126434862CD}"/>
+              </a:ext>
+            </a:extLst>
+          </p:cNvPr>
+          <p:cNvPicPr>
+            <a:picLocks noChangeAspect="1"/>
+          </p:cNvPicPr>
+          <p:nvPr/>
+        </p:nvPicPr>
+        <p:blipFill>
+          <a:blip r:embed="rId2" cstate="print">
+            <a:extLst>
+              <a:ext uri="{28A0092B-C50C-407E-A947-70E740481C1C}">
+                <a14:useLocalDpi xmlns:a14="http://schemas.microsoft.com/office/drawing/2010/main" val="0"/>
+              </a:ext>
+            </a:extLst>
+          </a:blip>
+          <a:srcRect l="16909" t="22905" r="19055" b="19358"/>
+          <a:stretch/>
+        </p:blipFill>
+        <p:spPr>
+          <a:xfrm>
+            <a:off x="5662374" y="1349477"/>
+            <a:ext cx="6150451" cy="4159046"/>
+          </a:xfrm>
+          <a:prstGeom prst="rect">
+            <a:avLst/>
+          </a:prstGeom>
+        </p:spPr>
+      </p:pic>
     </p:spTree>
     <p:extLst>
       <p:ext uri="{BB962C8B-B14F-4D97-AF65-F5344CB8AC3E}">
@@ -13509,18 +13544,18 @@
 </file>
 
 <file path=customXml/item2.xml><?xml version="1.0" encoding="utf-8"?>
-<p:properties xmlns:p="http://schemas.microsoft.com/office/2006/metadata/properties" xmlns:xsi="http://www.w3.org/2001/XMLSchema-instance" xmlns:pc="http://schemas.microsoft.com/office/infopath/2007/PartnerControls">
-  <documentManagement/>
-</p:properties>
-</file>
-
-<file path=customXml/item3.xml><?xml version="1.0" encoding="utf-8"?>
 <?mso-contentType ?>
 <FormTemplates xmlns="http://schemas.microsoft.com/sharepoint/v3/contenttype/forms">
   <Display>DocumentLibraryForm</Display>
   <Edit>DocumentLibraryForm</Edit>
   <New>DocumentLibraryForm</New>
 </FormTemplates>
+</file>
+
+<file path=customXml/item3.xml><?xml version="1.0" encoding="utf-8"?>
+<p:properties xmlns:p="http://schemas.microsoft.com/office/2006/metadata/properties" xmlns:xsi="http://www.w3.org/2001/XMLSchema-instance" xmlns:pc="http://schemas.microsoft.com/office/infopath/2007/PartnerControls">
+  <documentManagement/>
+</p:properties>
 </file>
 
 <file path=customXml/itemProps1.xml><?xml version="1.0" encoding="utf-8"?>
@@ -13542,6 +13577,14 @@
 </file>
 
 <file path=customXml/itemProps2.xml><?xml version="1.0" encoding="utf-8"?>
+<ds:datastoreItem xmlns:ds="http://schemas.openxmlformats.org/officeDocument/2006/customXml" ds:itemID="{A62B322D-2084-418A-8960-B074ADC5B6DB}">
+  <ds:schemaRefs>
+    <ds:schemaRef ds:uri="http://schemas.microsoft.com/sharepoint/v3/contenttype/forms"/>
+  </ds:schemaRefs>
+</ds:datastoreItem>
+</file>
+
+<file path=customXml/itemProps3.xml><?xml version="1.0" encoding="utf-8"?>
 <ds:datastoreItem xmlns:ds="http://schemas.openxmlformats.org/officeDocument/2006/customXml" ds:itemID="{91B09AE3-FA1D-40C8-A6CE-A2D9F55131C8}">
   <ds:schemaRefs>
     <ds:schemaRef ds:uri="http://schemas.microsoft.com/office/2006/metadata/properties"/>
@@ -13555,12 +13598,4 @@
     <ds:schemaRef ds:uri="025117e9-99fa-48ff-aab4-bb37753ec9db"/>
   </ds:schemaRefs>
 </ds:datastoreItem>
-</file>
-
-<file path=customXml/itemProps3.xml><?xml version="1.0" encoding="utf-8"?>
-<ds:datastoreItem xmlns:ds="http://schemas.openxmlformats.org/officeDocument/2006/customXml" ds:itemID="{A62B322D-2084-418A-8960-B074ADC5B6DB}">
-  <ds:schemaRefs>
-    <ds:schemaRef ds:uri="http://schemas.microsoft.com/sharepoint/v3/contenttype/forms"/>
-  </ds:schemaRefs>
-</ds:datastoreItem>
 </file>
</xml_diff>

<commit_message>
corrected data visualisation graph #51
</commit_message>
<xml_diff>
--- a/Diplomarbeit/doc/Presentations/DA-Präsentation2024_Zweitpräsentation.pptx
+++ b/Diplomarbeit/doc/Presentations/DA-Präsentation2024_Zweitpräsentation.pptx
@@ -9099,10 +9099,10 @@
       </p:sp>
       <p:pic>
         <p:nvPicPr>
-          <p:cNvPr id="9" name="Grafik 8">
+          <p:cNvPr id="7" name="Grafik 6">
             <a:extLst>
               <a:ext uri="{FF2B5EF4-FFF2-40B4-BE49-F238E27FC236}">
-                <a16:creationId xmlns:a16="http://schemas.microsoft.com/office/drawing/2014/main" id="{7ACBC51B-F618-00C1-CF3B-55E6158EBA89}"/>
+                <a16:creationId xmlns:a16="http://schemas.microsoft.com/office/drawing/2014/main" id="{C54A3553-9AFB-3424-3832-8327FE170FF7}"/>
               </a:ext>
             </a:extLst>
           </p:cNvPr>
@@ -9113,14 +9113,13 @@
         </p:nvPicPr>
         <p:blipFill>
           <a:blip r:embed="rId2"/>
-          <a:stretch>
-            <a:fillRect/>
-          </a:stretch>
+          <a:srcRect r="40313"/>
+          <a:stretch/>
         </p:blipFill>
         <p:spPr>
           <a:xfrm>
-            <a:off x="4760110" y="1691400"/>
-            <a:ext cx="6822290" cy="4113861"/>
+            <a:off x="4760110" y="1289050"/>
+            <a:ext cx="6822290" cy="4516211"/>
           </a:xfrm>
           <a:prstGeom prst="rect">
             <a:avLst/>
@@ -13544,18 +13543,18 @@
 </file>
 
 <file path=customXml/item2.xml><?xml version="1.0" encoding="utf-8"?>
+<p:properties xmlns:p="http://schemas.microsoft.com/office/2006/metadata/properties" xmlns:xsi="http://www.w3.org/2001/XMLSchema-instance" xmlns:pc="http://schemas.microsoft.com/office/infopath/2007/PartnerControls">
+  <documentManagement/>
+</p:properties>
+</file>
+
+<file path=customXml/item3.xml><?xml version="1.0" encoding="utf-8"?>
 <?mso-contentType ?>
 <FormTemplates xmlns="http://schemas.microsoft.com/sharepoint/v3/contenttype/forms">
   <Display>DocumentLibraryForm</Display>
   <Edit>DocumentLibraryForm</Edit>
   <New>DocumentLibraryForm</New>
 </FormTemplates>
-</file>
-
-<file path=customXml/item3.xml><?xml version="1.0" encoding="utf-8"?>
-<p:properties xmlns:p="http://schemas.microsoft.com/office/2006/metadata/properties" xmlns:xsi="http://www.w3.org/2001/XMLSchema-instance" xmlns:pc="http://schemas.microsoft.com/office/infopath/2007/PartnerControls">
-  <documentManagement/>
-</p:properties>
 </file>
 
 <file path=customXml/itemProps1.xml><?xml version="1.0" encoding="utf-8"?>
@@ -13577,14 +13576,6 @@
 </file>
 
 <file path=customXml/itemProps2.xml><?xml version="1.0" encoding="utf-8"?>
-<ds:datastoreItem xmlns:ds="http://schemas.openxmlformats.org/officeDocument/2006/customXml" ds:itemID="{A62B322D-2084-418A-8960-B074ADC5B6DB}">
-  <ds:schemaRefs>
-    <ds:schemaRef ds:uri="http://schemas.microsoft.com/sharepoint/v3/contenttype/forms"/>
-  </ds:schemaRefs>
-</ds:datastoreItem>
-</file>
-
-<file path=customXml/itemProps3.xml><?xml version="1.0" encoding="utf-8"?>
 <ds:datastoreItem xmlns:ds="http://schemas.openxmlformats.org/officeDocument/2006/customXml" ds:itemID="{91B09AE3-FA1D-40C8-A6CE-A2D9F55131C8}">
   <ds:schemaRefs>
     <ds:schemaRef ds:uri="http://schemas.microsoft.com/office/2006/metadata/properties"/>
@@ -13598,4 +13589,12 @@
     <ds:schemaRef ds:uri="025117e9-99fa-48ff-aab4-bb37753ec9db"/>
   </ds:schemaRefs>
 </ds:datastoreItem>
+</file>
+
+<file path=customXml/itemProps3.xml><?xml version="1.0" encoding="utf-8"?>
+<ds:datastoreItem xmlns:ds="http://schemas.openxmlformats.org/officeDocument/2006/customXml" ds:itemID="{A62B322D-2084-418A-8960-B074ADC5B6DB}">
+  <ds:schemaRefs>
+    <ds:schemaRef ds:uri="http://schemas.microsoft.com/sharepoint/v3/contenttype/forms"/>
+  </ds:schemaRefs>
+</ds:datastoreItem>
 </file>
</xml_diff>

<commit_message>
Temporary Final Version #51
</commit_message>
<xml_diff>
--- a/Diplomarbeit/doc/Presentations/DA-Präsentation2024_Zweitpräsentation.pptx
+++ b/Diplomarbeit/doc/Presentations/DA-Präsentation2024_Zweitpräsentation.pptx
@@ -18,8 +18,8 @@
     <p:sldId id="2593" r:id="rId9"/>
     <p:sldId id="2594" r:id="rId10"/>
     <p:sldId id="2595" r:id="rId11"/>
-    <p:sldId id="2597" r:id="rId12"/>
-    <p:sldId id="2598" r:id="rId13"/>
+    <p:sldId id="2610" r:id="rId12"/>
+    <p:sldId id="2609" r:id="rId13"/>
     <p:sldId id="2596" r:id="rId14"/>
     <p:sldId id="2584" r:id="rId15"/>
     <p:sldId id="2585" r:id="rId16"/>
@@ -1523,7 +1523,7 @@
     </p:spTree>
     <p:extLst>
       <p:ext uri="{BB962C8B-B14F-4D97-AF65-F5344CB8AC3E}">
-        <p14:creationId xmlns:p14="http://schemas.microsoft.com/office/powerpoint/2010/main" val="1148185079"/>
+        <p14:creationId xmlns:p14="http://schemas.microsoft.com/office/powerpoint/2010/main" val="1854314039"/>
       </p:ext>
     </p:extLst>
   </p:cSld>
@@ -1608,7 +1608,7 @@
     </p:spTree>
     <p:extLst>
       <p:ext uri="{BB962C8B-B14F-4D97-AF65-F5344CB8AC3E}">
-        <p14:creationId xmlns:p14="http://schemas.microsoft.com/office/powerpoint/2010/main" val="2722358604"/>
+        <p14:creationId xmlns:p14="http://schemas.microsoft.com/office/powerpoint/2010/main" val="3983324849"/>
       </p:ext>
     </p:extLst>
   </p:cSld>
@@ -5021,7 +5021,7 @@
         </p:nvSpPr>
         <p:spPr>
           <a:xfrm>
-            <a:off x="0" y="-4243"/>
+            <a:off x="0" y="0"/>
             <a:ext cx="12257237" cy="6858000"/>
           </a:xfrm>
           <a:prstGeom prst="rect">
@@ -5161,7 +5161,7 @@
         </p:blipFill>
         <p:spPr>
           <a:xfrm>
-            <a:off x="-65238" y="4243"/>
+            <a:off x="-65238" y="236259"/>
             <a:ext cx="12257237" cy="6215588"/>
           </a:xfrm>
           <a:prstGeom prst="rect">
@@ -5183,8 +5183,8 @@
         </p:nvSpPr>
         <p:spPr>
           <a:xfrm>
-            <a:off x="4054365" y="4560415"/>
-            <a:ext cx="6195848" cy="400110"/>
+            <a:off x="4054365" y="4792431"/>
+            <a:ext cx="6195848" cy="523220"/>
           </a:xfrm>
           <a:prstGeom prst="rect">
             <a:avLst/>
@@ -5198,7 +5198,7 @@
           <a:lstStyle/>
           <a:p>
             <a:r>
-              <a:rPr lang="de-AT" sz="2000" b="1" u="sng">
+              <a:rPr lang="de-AT" sz="2800" b="1" u="sng" dirty="0">
                 <a:solidFill>
                   <a:schemeClr val="bg1"/>
                 </a:solidFill>
@@ -5222,8 +5222,8 @@
         </p:nvSpPr>
         <p:spPr>
           <a:xfrm>
-            <a:off x="9289300" y="2092293"/>
-            <a:ext cx="6195848" cy="400110"/>
+            <a:off x="3964152" y="3143998"/>
+            <a:ext cx="1726964" cy="400110"/>
           </a:xfrm>
           <a:prstGeom prst="rect">
             <a:avLst/>
@@ -5237,14 +5237,14 @@
           <a:lstStyle/>
           <a:p>
             <a:r>
-              <a:rPr lang="de-AT" sz="2000">
+              <a:rPr lang="de-AT" sz="2000" u="sng" dirty="0">
                 <a:solidFill>
                   <a:schemeClr val="bg1"/>
                 </a:solidFill>
               </a:rPr>
               <a:t>Datenbanken</a:t>
             </a:r>
-            <a:endParaRPr lang="en-US"/>
+            <a:endParaRPr lang="en-US" u="sng" dirty="0"/>
           </a:p>
         </p:txBody>
       </p:sp>
@@ -5262,7 +5262,7 @@
         </p:nvSpPr>
         <p:spPr>
           <a:xfrm>
-            <a:off x="4269928" y="2061515"/>
+            <a:off x="2180523" y="2729797"/>
             <a:ext cx="1397226" cy="400110"/>
           </a:xfrm>
           <a:prstGeom prst="rect">
@@ -5277,14 +5277,14 @@
           <a:lstStyle/>
           <a:p>
             <a:r>
-              <a:rPr lang="de-AT" sz="2000">
+              <a:rPr lang="de-AT" sz="2000" u="sng" dirty="0">
                 <a:solidFill>
                   <a:schemeClr val="bg1"/>
                 </a:solidFill>
               </a:rPr>
               <a:t>Server</a:t>
             </a:r>
-            <a:endParaRPr lang="en-US"/>
+            <a:endParaRPr lang="en-US" u="sng" dirty="0"/>
           </a:p>
         </p:txBody>
       </p:sp>
@@ -5302,7 +5302,7 @@
         </p:nvSpPr>
         <p:spPr>
           <a:xfrm>
-            <a:off x="1067851" y="2092887"/>
+            <a:off x="1067851" y="2324903"/>
             <a:ext cx="743434" cy="400110"/>
           </a:xfrm>
           <a:prstGeom prst="rect">
@@ -5317,14 +5317,14 @@
           <a:lstStyle/>
           <a:p>
             <a:r>
-              <a:rPr lang="de-AT" sz="2000" dirty="0">
+              <a:rPr lang="de-AT" sz="2000" u="sng" dirty="0">
                 <a:solidFill>
                   <a:schemeClr val="bg1"/>
                 </a:solidFill>
               </a:rPr>
               <a:t>REST</a:t>
             </a:r>
-            <a:endParaRPr lang="en-US" dirty="0">
+            <a:endParaRPr lang="en-US" u="sng" dirty="0">
               <a:solidFill>
                 <a:schemeClr val="bg1"/>
               </a:solidFill>
@@ -5360,7 +5360,7 @@
         </p:blipFill>
         <p:spPr>
           <a:xfrm>
-            <a:off x="6267689" y="1824838"/>
+            <a:off x="6267689" y="2056854"/>
             <a:ext cx="1971959" cy="1971959"/>
           </a:xfrm>
           <a:prstGeom prst="rect">
@@ -5382,7 +5382,7 @@
         </p:nvSpPr>
         <p:spPr>
           <a:xfrm>
-            <a:off x="-65238" y="3879305"/>
+            <a:off x="-65238" y="4111321"/>
             <a:ext cx="1133089" cy="268309"/>
           </a:xfrm>
           <a:prstGeom prst="rect">
@@ -5463,6 +5463,9 @@
                     <p:cTn id="3" fill="hold">
                       <p:stCondLst>
                         <p:cond delay="indefinite"/>
+                        <p:cond evt="onBegin" delay="0">
+                          <p:tn val="2"/>
+                        </p:cond>
                       </p:stCondLst>
                       <p:childTnLst>
                         <p:par>
@@ -5472,9 +5475,9 @@
                             </p:stCondLst>
                             <p:childTnLst>
                               <p:par>
-                                <p:cTn id="5" presetID="1" presetClass="entr" presetSubtype="0" fill="hold" nodeType="clickEffect">
+                                <p:cTn id="5" presetID="1" presetClass="entr" presetSubtype="0" fill="hold" nodeType="afterEffect">
                                   <p:stCondLst>
-                                    <p:cond delay="0"/>
+                                    <p:cond delay="250"/>
                                   </p:stCondLst>
                                   <p:childTnLst>
                                     <p:set>
@@ -5505,30 +5508,21 @@
                             </p:childTnLst>
                           </p:cTn>
                         </p:par>
-                      </p:childTnLst>
-                    </p:cTn>
-                  </p:par>
-                  <p:par>
-                    <p:cTn id="7" fill="hold">
-                      <p:stCondLst>
-                        <p:cond delay="indefinite"/>
-                      </p:stCondLst>
-                      <p:childTnLst>
                         <p:par>
-                          <p:cTn id="8" fill="hold">
+                          <p:cTn id="7" fill="hold">
                             <p:stCondLst>
-                              <p:cond delay="0"/>
+                              <p:cond delay="250"/>
                             </p:stCondLst>
                             <p:childTnLst>
                               <p:par>
-                                <p:cTn id="9" presetID="2" presetClass="entr" presetSubtype="8" fill="hold" nodeType="clickEffect">
+                                <p:cTn id="8" presetID="2" presetClass="entr" presetSubtype="8" fill="hold" nodeType="afterEffect">
                                   <p:stCondLst>
-                                    <p:cond delay="0"/>
+                                    <p:cond delay="250"/>
                                   </p:stCondLst>
                                   <p:childTnLst>
                                     <p:set>
                                       <p:cBhvr>
-                                        <p:cTn id="10" dur="1" fill="hold">
+                                        <p:cTn id="9" dur="1" fill="hold">
                                           <p:stCondLst>
                                             <p:cond delay="0"/>
                                           </p:stCondLst>
@@ -5550,7 +5544,7 @@
                                     </p:set>
                                     <p:anim calcmode="lin" valueType="num">
                                       <p:cBhvr additive="base">
-                                        <p:cTn id="11" dur="500" fill="hold"/>
+                                        <p:cTn id="10" dur="500" fill="hold"/>
                                         <p:tgtEl>
                                           <p:spTgt spid="19">
                                             <p:txEl>
@@ -5577,7 +5571,7 @@
                                     </p:anim>
                                     <p:anim calcmode="lin" valueType="num">
                                       <p:cBhvr additive="base">
-                                        <p:cTn id="12" dur="500" fill="hold"/>
+                                        <p:cTn id="11" dur="500" fill="hold"/>
                                         <p:tgtEl>
                                           <p:spTgt spid="19">
                                             <p:txEl>
@@ -5609,20 +5603,20 @@
                           </p:cTn>
                         </p:par>
                         <p:par>
-                          <p:cTn id="13" fill="hold">
+                          <p:cTn id="12" fill="hold">
                             <p:stCondLst>
-                              <p:cond delay="500"/>
+                              <p:cond delay="1000"/>
                             </p:stCondLst>
                             <p:childTnLst>
                               <p:par>
-                                <p:cTn id="14" presetID="2" presetClass="entr" presetSubtype="1" fill="hold" nodeType="afterEffect">
+                                <p:cTn id="13" presetID="2" presetClass="entr" presetSubtype="1" fill="hold" nodeType="afterEffect">
                                   <p:stCondLst>
                                     <p:cond delay="750"/>
                                   </p:stCondLst>
                                   <p:childTnLst>
                                     <p:set>
                                       <p:cBhvr>
-                                        <p:cTn id="15" dur="1" fill="hold">
+                                        <p:cTn id="14" dur="1" fill="hold">
                                           <p:stCondLst>
                                             <p:cond delay="0"/>
                                           </p:stCondLst>
@@ -5644,7 +5638,7 @@
                                     </p:set>
                                     <p:anim calcmode="lin" valueType="num">
                                       <p:cBhvr additive="base">
-                                        <p:cTn id="16" dur="500" fill="hold"/>
+                                        <p:cTn id="15" dur="500" fill="hold"/>
                                         <p:tgtEl>
                                           <p:spTgt spid="15">
                                             <p:txEl>
@@ -5671,7 +5665,7 @@
                                     </p:anim>
                                     <p:anim calcmode="lin" valueType="num">
                                       <p:cBhvr additive="base">
-                                        <p:cTn id="17" dur="500" fill="hold"/>
+                                        <p:cTn id="16" dur="500" fill="hold"/>
                                         <p:tgtEl>
                                           <p:spTgt spid="15">
                                             <p:txEl>
@@ -5703,20 +5697,20 @@
                           </p:cTn>
                         </p:par>
                         <p:par>
-                          <p:cTn id="18" fill="hold">
+                          <p:cTn id="17" fill="hold">
                             <p:stCondLst>
-                              <p:cond delay="1750"/>
+                              <p:cond delay="2250"/>
                             </p:stCondLst>
                             <p:childTnLst>
                               <p:par>
-                                <p:cTn id="19" presetID="2" presetClass="entr" presetSubtype="2" fill="hold" nodeType="afterEffect">
+                                <p:cTn id="18" presetID="2" presetClass="entr" presetSubtype="2" fill="hold" nodeType="afterEffect">
                                   <p:stCondLst>
                                     <p:cond delay="500"/>
                                   </p:stCondLst>
                                   <p:childTnLst>
                                     <p:set>
                                       <p:cBhvr>
-                                        <p:cTn id="20" dur="1" fill="hold">
+                                        <p:cTn id="19" dur="1" fill="hold">
                                           <p:stCondLst>
                                             <p:cond delay="0"/>
                                           </p:stCondLst>
@@ -5738,7 +5732,7 @@
                                     </p:set>
                                     <p:anim calcmode="lin" valueType="num">
                                       <p:cBhvr additive="base">
-                                        <p:cTn id="21" dur="500" fill="hold"/>
+                                        <p:cTn id="20" dur="500" fill="hold"/>
                                         <p:tgtEl>
                                           <p:spTgt spid="11">
                                             <p:txEl>
@@ -5765,7 +5759,7 @@
                                     </p:anim>
                                     <p:anim calcmode="lin" valueType="num">
                                       <p:cBhvr additive="base">
-                                        <p:cTn id="22" dur="500" fill="hold"/>
+                                        <p:cTn id="21" dur="500" fill="hold"/>
                                         <p:tgtEl>
                                           <p:spTgt spid="11">
                                             <p:txEl>
@@ -5797,20 +5791,20 @@
                           </p:cTn>
                         </p:par>
                         <p:par>
-                          <p:cTn id="23" fill="hold">
+                          <p:cTn id="22" fill="hold">
                             <p:stCondLst>
-                              <p:cond delay="2750"/>
+                              <p:cond delay="3250"/>
                             </p:stCondLst>
                             <p:childTnLst>
                               <p:par>
-                                <p:cTn id="24" presetID="10" presetClass="entr" presetSubtype="0" fill="hold" nodeType="afterEffect">
+                                <p:cTn id="23" presetID="10" presetClass="entr" presetSubtype="0" fill="hold" nodeType="afterEffect">
                                   <p:stCondLst>
                                     <p:cond delay="500"/>
                                   </p:stCondLst>
                                   <p:childTnLst>
                                     <p:set>
                                       <p:cBhvr>
-                                        <p:cTn id="25" dur="1" fill="hold">
+                                        <p:cTn id="24" dur="1" fill="hold">
                                           <p:stCondLst>
                                             <p:cond delay="0"/>
                                           </p:stCondLst>
@@ -5828,7 +5822,7 @@
                                     </p:set>
                                     <p:animEffect transition="in" filter="fade">
                                       <p:cBhvr>
-                                        <p:cTn id="26" dur="500"/>
+                                        <p:cTn id="25" dur="500"/>
                                         <p:tgtEl>
                                           <p:spTgt spid="3"/>
                                         </p:tgtEl>
@@ -7243,10 +7237,10 @@
       </p:sp>
       <p:pic>
         <p:nvPicPr>
-          <p:cNvPr id="8" name="Inhaltsplatzhalter 7">
-            <a:extLst>
-              <a:ext uri="{FF2B5EF4-FFF2-40B4-BE49-F238E27FC236}">
-                <a16:creationId xmlns:a16="http://schemas.microsoft.com/office/drawing/2014/main" id="{48CABA1A-8C5B-67B0-5EB4-BAD28F2E27CA}"/>
+          <p:cNvPr id="13" name="Inhaltsplatzhalter 12" descr="Ein Bild, das Text, Screenshot, Reihe, Schrift enthält.&#10;&#10;Automatisch generierte Beschreibung">
+            <a:extLst>
+              <a:ext uri="{FF2B5EF4-FFF2-40B4-BE49-F238E27FC236}">
+                <a16:creationId xmlns:a16="http://schemas.microsoft.com/office/drawing/2014/main" id="{51ED9C1D-0E0F-1938-08D9-F34BB244C246}"/>
               </a:ext>
             </a:extLst>
           </p:cNvPr>
@@ -7258,7 +7252,7 @@
           </p:nvPr>
         </p:nvPicPr>
         <p:blipFill>
-          <a:blip r:embed="rId2">
+          <a:blip r:embed="rId2" cstate="print">
             <a:extLst>
               <a:ext uri="{28A0092B-C50C-407E-A947-70E740481C1C}">
                 <a14:useLocalDpi xmlns:a14="http://schemas.microsoft.com/office/drawing/2010/main" val="0"/>
@@ -7271,8 +7265,8 @@
         </p:blipFill>
         <p:spPr>
           <a:xfrm>
-            <a:off x="969158" y="2355661"/>
-            <a:ext cx="10613242" cy="2146678"/>
+            <a:off x="609600" y="1096268"/>
+            <a:ext cx="10972800" cy="4986139"/>
           </a:xfrm>
         </p:spPr>
       </p:pic>
@@ -7448,11 +7442,11 @@
                 </a:highlight>
                 <a:latin typeface="DIN-Web-Pro"/>
               </a:rPr>
-              <a:t>Wissende Kosten: € 70,86</a:t>
-            </a:r>
-          </a:p>
-          <a:p>
-            <a:pPr lvl="2"/>
+              <a:t>€ 13,74 pro Person </a:t>
+            </a:r>
+          </a:p>
+          <a:p>
+            <a:pPr lvl="1"/>
             <a:r>
               <a:rPr lang="de-AT" dirty="0">
                 <a:solidFill>
@@ -7463,82 +7457,7 @@
                 </a:highlight>
                 <a:latin typeface="DIN-Web-Pro"/>
               </a:rPr>
-              <a:t>3 Prototypen je: € 23,62</a:t>
-            </a:r>
-          </a:p>
-          <a:p>
-            <a:pPr lvl="3"/>
-            <a:r>
-              <a:rPr lang="de-AT" dirty="0">
-                <a:solidFill>
-                  <a:srgbClr val="000000"/>
-                </a:solidFill>
-                <a:highlight>
-                  <a:srgbClr val="FFFFFF"/>
-                </a:highlight>
-                <a:latin typeface="DIN-Web-Pro"/>
-              </a:rPr>
-              <a:t>Esp32: € 13,89</a:t>
-            </a:r>
-          </a:p>
-          <a:p>
-            <a:pPr lvl="3"/>
-            <a:r>
-              <a:rPr lang="de-AT" dirty="0">
-                <a:solidFill>
-                  <a:srgbClr val="000000"/>
-                </a:solidFill>
-                <a:highlight>
-                  <a:srgbClr val="FFFFFF"/>
-                </a:highlight>
-                <a:latin typeface="DIN-Web-Pro"/>
-              </a:rPr>
-              <a:t>GPS-Sensor: € 1,11</a:t>
-            </a:r>
-          </a:p>
-          <a:p>
-            <a:pPr lvl="3"/>
-            <a:r>
-              <a:rPr lang="de-AT" dirty="0">
-                <a:solidFill>
-                  <a:srgbClr val="000000"/>
-                </a:solidFill>
-                <a:highlight>
-                  <a:srgbClr val="FFFFFF"/>
-                </a:highlight>
-                <a:latin typeface="DIN-Web-Pro"/>
-              </a:rPr>
-              <a:t>Vibrationssensor: € 2,72</a:t>
-            </a:r>
-          </a:p>
-          <a:p>
-            <a:pPr lvl="3"/>
-            <a:r>
-              <a:rPr lang="de-AT" dirty="0">
-                <a:solidFill>
-                  <a:srgbClr val="000000"/>
-                </a:solidFill>
-                <a:highlight>
-                  <a:srgbClr val="FFFFFF"/>
-                </a:highlight>
-                <a:latin typeface="DIN-Web-Pro"/>
-              </a:rPr>
-              <a:t>BME 280: € 5,90</a:t>
-            </a:r>
-          </a:p>
-          <a:p>
-            <a:pPr lvl="1"/>
-            <a:r>
-              <a:rPr lang="de-AT" dirty="0">
-                <a:solidFill>
-                  <a:srgbClr val="000000"/>
-                </a:solidFill>
-                <a:highlight>
-                  <a:srgbClr val="FFFFFF"/>
-                </a:highlight>
-                <a:latin typeface="DIN-Web-Pro"/>
-              </a:rPr>
-              <a:t>Maximale Kosten € 200,00</a:t>
+              <a:t>€ 41,21 insgesamt</a:t>
             </a:r>
           </a:p>
           <a:p>
@@ -8646,7 +8565,7 @@
       </p:sp>
       <p:pic>
         <p:nvPicPr>
-          <p:cNvPr id="2050" name="Picture 2">
+          <p:cNvPr id="6" name="Picture 2">
             <a:extLst>
               <a:ext uri="{FF2B5EF4-FFF2-40B4-BE49-F238E27FC236}">
                 <a16:creationId xmlns:a16="http://schemas.microsoft.com/office/drawing/2014/main" id="{9717D544-01A3-046C-A61C-C7EA4071713D}"/>
@@ -8673,8 +8592,53 @@
         </p:blipFill>
         <p:spPr bwMode="auto">
           <a:xfrm>
-            <a:off x="5335589" y="1582580"/>
+            <a:off x="5378828" y="1437554"/>
             <a:ext cx="6399211" cy="3692839"/>
+          </a:xfrm>
+          <a:prstGeom prst="rect">
+            <a:avLst/>
+          </a:prstGeom>
+          <a:noFill/>
+          <a:extLst>
+            <a:ext uri="{909E8E84-426E-40DD-AFC4-6F175D3DCCD1}">
+              <a14:hiddenFill xmlns:a14="http://schemas.microsoft.com/office/drawing/2010/main">
+                <a:solidFill>
+                  <a:srgbClr val="FFFFFF"/>
+                </a:solidFill>
+              </a14:hiddenFill>
+            </a:ext>
+          </a:extLst>
+        </p:spPr>
+      </p:pic>
+      <p:pic>
+        <p:nvPicPr>
+          <p:cNvPr id="7" name="Picture 2">
+            <a:extLst>
+              <a:ext uri="{FF2B5EF4-FFF2-40B4-BE49-F238E27FC236}">
+                <a16:creationId xmlns:a16="http://schemas.microsoft.com/office/drawing/2014/main" id="{3FC2D77A-3433-E2FB-4E43-D0800364C129}"/>
+              </a:ext>
+            </a:extLst>
+          </p:cNvPr>
+          <p:cNvPicPr>
+            <a:picLocks noChangeAspect="1" noChangeArrowheads="1"/>
+          </p:cNvPicPr>
+          <p:nvPr/>
+        </p:nvPicPr>
+        <p:blipFill rotWithShape="1">
+          <a:blip r:embed="rId2" cstate="print">
+            <a:extLst>
+              <a:ext uri="{28A0092B-C50C-407E-A947-70E740481C1C}">
+                <a14:useLocalDpi xmlns:a14="http://schemas.microsoft.com/office/drawing/2010/main" val="0"/>
+              </a:ext>
+            </a:extLst>
+          </a:blip>
+          <a:srcRect l="16147" t="55214" r="67967" b="8777"/>
+          <a:stretch/>
+        </p:blipFill>
+        <p:spPr bwMode="auto">
+          <a:xfrm>
+            <a:off x="6096000" y="3418353"/>
+            <a:ext cx="1691149" cy="1913652"/>
           </a:xfrm>
           <a:prstGeom prst="rect">
             <a:avLst/>
@@ -9053,15 +9017,15 @@
           <a:lstStyle/>
           <a:p>
             <a:r>
-              <a:rPr lang="de-AT"/>
+              <a:rPr lang="de-AT" dirty="0"/>
               <a:t>CONTRUDE </a:t>
             </a:r>
             <a:r>
-              <a:rPr lang="de-AT" err="1"/>
+              <a:rPr lang="de-AT" dirty="0" err="1"/>
               <a:t>Gekle</a:t>
             </a:r>
             <a:r>
-              <a:rPr lang="de-AT"/>
+              <a:rPr lang="de-AT" dirty="0"/>
               <a:t>, Kampl, Schrempf</a:t>
             </a:r>
           </a:p>
@@ -9198,10 +9162,10 @@
       </p:sp>
       <p:sp>
         <p:nvSpPr>
-          <p:cNvPr id="3" name="Inhaltsplatzhalter 2">
-            <a:extLst>
-              <a:ext uri="{FF2B5EF4-FFF2-40B4-BE49-F238E27FC236}">
-                <a16:creationId xmlns:a16="http://schemas.microsoft.com/office/drawing/2014/main" id="{C2DBF5C7-A707-ABDC-AAC2-B4DED04D0B9D}"/>
+          <p:cNvPr id="4" name="Fußzeilenplatzhalter 3">
+            <a:extLst>
+              <a:ext uri="{FF2B5EF4-FFF2-40B4-BE49-F238E27FC236}">
+                <a16:creationId xmlns:a16="http://schemas.microsoft.com/office/drawing/2014/main" id="{E5F5223E-8ED4-4C95-5CDA-F14BDC1EEAAF}"/>
               </a:ext>
             </a:extLst>
           </p:cNvPr>
@@ -9209,7 +9173,7 @@
             <a:spLocks noGrp="1"/>
           </p:cNvSpPr>
           <p:nvPr>
-            <p:ph idx="1"/>
+            <p:ph type="ftr" sz="quarter" idx="11"/>
           </p:nvPr>
         </p:nvSpPr>
         <p:spPr/>
@@ -9218,60 +9182,16 @@
           <a:lstStyle/>
           <a:p>
             <a:r>
-              <a:rPr lang="de-DE" dirty="0"/>
-              <a:t>Gesundheit &amp; Wohlergehen</a:t>
-            </a:r>
-          </a:p>
-          <a:p>
-            <a:r>
-              <a:rPr lang="de-DE" dirty="0"/>
-              <a:t>Menschenwürdige Arbeit &amp; Wirtschaftswachstum</a:t>
-            </a:r>
-          </a:p>
-          <a:p>
-            <a:r>
-              <a:rPr lang="de-DE" dirty="0"/>
-              <a:t>Industrie, Innovation &amp; Infrastruktur</a:t>
-            </a:r>
-          </a:p>
-          <a:p>
-            <a:r>
-              <a:rPr lang="de-DE" dirty="0"/>
-              <a:t>Nachhaltiger Konsum &amp; Produktion</a:t>
-            </a:r>
-          </a:p>
-          <a:p>
-            <a:r>
-              <a:rPr lang="de-DE" dirty="0"/>
-              <a:t>Klimaschutz</a:t>
-            </a:r>
-          </a:p>
-        </p:txBody>
-      </p:sp>
-      <p:sp>
-        <p:nvSpPr>
-          <p:cNvPr id="4" name="Fußzeilenplatzhalter 3">
-            <a:extLst>
-              <a:ext uri="{FF2B5EF4-FFF2-40B4-BE49-F238E27FC236}">
-                <a16:creationId xmlns:a16="http://schemas.microsoft.com/office/drawing/2014/main" id="{E5F5223E-8ED4-4C95-5CDA-F14BDC1EEAAF}"/>
-              </a:ext>
-            </a:extLst>
-          </p:cNvPr>
-          <p:cNvSpPr>
-            <a:spLocks noGrp="1"/>
-          </p:cNvSpPr>
-          <p:nvPr>
-            <p:ph type="ftr" sz="quarter" idx="11"/>
-          </p:nvPr>
-        </p:nvSpPr>
-        <p:spPr/>
-        <p:txBody>
-          <a:bodyPr/>
-          <a:lstStyle/>
-          <a:p>
-            <a:r>
-              <a:rPr lang="de-AT"/>
-              <a:t>Diplomarbeit Name, Name</a:t>
+              <a:rPr lang="de-AT" dirty="0"/>
+              <a:t>CONTRUDE </a:t>
+            </a:r>
+            <a:r>
+              <a:rPr lang="de-AT" dirty="0" err="1"/>
+              <a:t>Gekle</a:t>
+            </a:r>
+            <a:r>
+              <a:rPr lang="de-AT" dirty="0"/>
+              <a:t>, Kampl, Schrempf</a:t>
             </a:r>
           </a:p>
         </p:txBody>
@@ -9306,6 +9226,186 @@
           </a:p>
         </p:txBody>
       </p:sp>
+      <p:pic>
+        <p:nvPicPr>
+          <p:cNvPr id="7" name="Grafik 6" descr="Ein Bild, das Text, Schrift, Grün, Grafiken enthält.&#10;&#10;Automatisch generierte Beschreibung">
+            <a:extLst>
+              <a:ext uri="{FF2B5EF4-FFF2-40B4-BE49-F238E27FC236}">
+                <a16:creationId xmlns:a16="http://schemas.microsoft.com/office/drawing/2014/main" id="{BB3329D1-48C7-94F5-D68C-8796277FBDDB}"/>
+              </a:ext>
+            </a:extLst>
+          </p:cNvPr>
+          <p:cNvPicPr>
+            <a:picLocks noChangeAspect="1"/>
+          </p:cNvPicPr>
+          <p:nvPr/>
+        </p:nvPicPr>
+        <p:blipFill>
+          <a:blip r:embed="rId3" cstate="print">
+            <a:extLst>
+              <a:ext uri="{28A0092B-C50C-407E-A947-70E740481C1C}">
+                <a14:useLocalDpi xmlns:a14="http://schemas.microsoft.com/office/drawing/2010/main" val="0"/>
+              </a:ext>
+            </a:extLst>
+          </a:blip>
+          <a:stretch>
+            <a:fillRect/>
+          </a:stretch>
+        </p:blipFill>
+        <p:spPr>
+          <a:xfrm>
+            <a:off x="2043046" y="1141214"/>
+            <a:ext cx="2354461" cy="2354461"/>
+          </a:xfrm>
+          <a:prstGeom prst="rect">
+            <a:avLst/>
+          </a:prstGeom>
+        </p:spPr>
+      </p:pic>
+      <p:pic>
+        <p:nvPicPr>
+          <p:cNvPr id="10" name="Grafik 9" descr="Ein Bild, das Text, Schrift, Grafiken, Logo enthält.&#10;&#10;Automatisch generierte Beschreibung">
+            <a:extLst>
+              <a:ext uri="{FF2B5EF4-FFF2-40B4-BE49-F238E27FC236}">
+                <a16:creationId xmlns:a16="http://schemas.microsoft.com/office/drawing/2014/main" id="{D5DB498B-8B11-E80E-56FC-E602297D0C6A}"/>
+              </a:ext>
+            </a:extLst>
+          </p:cNvPr>
+          <p:cNvPicPr>
+            <a:picLocks noChangeAspect="1"/>
+          </p:cNvPicPr>
+          <p:nvPr/>
+        </p:nvPicPr>
+        <p:blipFill>
+          <a:blip r:embed="rId4" cstate="print">
+            <a:extLst>
+              <a:ext uri="{28A0092B-C50C-407E-A947-70E740481C1C}">
+                <a14:useLocalDpi xmlns:a14="http://schemas.microsoft.com/office/drawing/2010/main" val="0"/>
+              </a:ext>
+            </a:extLst>
+          </a:blip>
+          <a:stretch>
+            <a:fillRect/>
+          </a:stretch>
+        </p:blipFill>
+        <p:spPr>
+          <a:xfrm>
+            <a:off x="5077564" y="1141214"/>
+            <a:ext cx="2354461" cy="2354461"/>
+          </a:xfrm>
+          <a:prstGeom prst="rect">
+            <a:avLst/>
+          </a:prstGeom>
+        </p:spPr>
+      </p:pic>
+      <p:pic>
+        <p:nvPicPr>
+          <p:cNvPr id="12" name="Grafik 11" descr="Ein Bild, das Text, Design, Grafiken, Schrift enthält.&#10;&#10;Automatisch generierte Beschreibung">
+            <a:extLst>
+              <a:ext uri="{FF2B5EF4-FFF2-40B4-BE49-F238E27FC236}">
+                <a16:creationId xmlns:a16="http://schemas.microsoft.com/office/drawing/2014/main" id="{5FC52199-4A3F-3E14-874F-7564EE6BFC29}"/>
+              </a:ext>
+            </a:extLst>
+          </p:cNvPr>
+          <p:cNvPicPr>
+            <a:picLocks noChangeAspect="1"/>
+          </p:cNvPicPr>
+          <p:nvPr/>
+        </p:nvPicPr>
+        <p:blipFill>
+          <a:blip r:embed="rId5" cstate="print">
+            <a:extLst>
+              <a:ext uri="{28A0092B-C50C-407E-A947-70E740481C1C}">
+                <a14:useLocalDpi xmlns:a14="http://schemas.microsoft.com/office/drawing/2010/main" val="0"/>
+              </a:ext>
+            </a:extLst>
+          </a:blip>
+          <a:stretch>
+            <a:fillRect/>
+          </a:stretch>
+        </p:blipFill>
+        <p:spPr>
+          <a:xfrm>
+            <a:off x="8112082" y="1141214"/>
+            <a:ext cx="2354461" cy="2354461"/>
+          </a:xfrm>
+          <a:prstGeom prst="rect">
+            <a:avLst/>
+          </a:prstGeom>
+        </p:spPr>
+      </p:pic>
+      <p:pic>
+        <p:nvPicPr>
+          <p:cNvPr id="14" name="Grafik 13" descr="Ein Bild, das Text, Schrift, Logo, Grafiken enthält.&#10;&#10;Automatisch generierte Beschreibung">
+            <a:extLst>
+              <a:ext uri="{FF2B5EF4-FFF2-40B4-BE49-F238E27FC236}">
+                <a16:creationId xmlns:a16="http://schemas.microsoft.com/office/drawing/2014/main" id="{F4B79455-BB9C-413C-9CEB-C51B694642FA}"/>
+              </a:ext>
+            </a:extLst>
+          </p:cNvPr>
+          <p:cNvPicPr>
+            <a:picLocks noChangeAspect="1"/>
+          </p:cNvPicPr>
+          <p:nvPr/>
+        </p:nvPicPr>
+        <p:blipFill>
+          <a:blip r:embed="rId6" cstate="print">
+            <a:extLst>
+              <a:ext uri="{28A0092B-C50C-407E-A947-70E740481C1C}">
+                <a14:useLocalDpi xmlns:a14="http://schemas.microsoft.com/office/drawing/2010/main" val="0"/>
+              </a:ext>
+            </a:extLst>
+          </a:blip>
+          <a:stretch>
+            <a:fillRect/>
+          </a:stretch>
+        </p:blipFill>
+        <p:spPr>
+          <a:xfrm>
+            <a:off x="3560305" y="3724394"/>
+            <a:ext cx="2354461" cy="2354461"/>
+          </a:xfrm>
+          <a:prstGeom prst="rect">
+            <a:avLst/>
+          </a:prstGeom>
+        </p:spPr>
+      </p:pic>
+      <p:pic>
+        <p:nvPicPr>
+          <p:cNvPr id="16" name="Grafik 15" descr="Ein Bild, das Text, Logo, Grafiken, Grafikdesign enthält.&#10;&#10;Automatisch generierte Beschreibung">
+            <a:extLst>
+              <a:ext uri="{FF2B5EF4-FFF2-40B4-BE49-F238E27FC236}">
+                <a16:creationId xmlns:a16="http://schemas.microsoft.com/office/drawing/2014/main" id="{4A1CF2A3-C671-DF8D-6D25-6E8CA96ED248}"/>
+              </a:ext>
+            </a:extLst>
+          </p:cNvPr>
+          <p:cNvPicPr>
+            <a:picLocks noChangeAspect="1"/>
+          </p:cNvPicPr>
+          <p:nvPr/>
+        </p:nvPicPr>
+        <p:blipFill>
+          <a:blip r:embed="rId7" cstate="print">
+            <a:extLst>
+              <a:ext uri="{28A0092B-C50C-407E-A947-70E740481C1C}">
+                <a14:useLocalDpi xmlns:a14="http://schemas.microsoft.com/office/drawing/2010/main" val="0"/>
+              </a:ext>
+            </a:extLst>
+          </a:blip>
+          <a:stretch>
+            <a:fillRect/>
+          </a:stretch>
+        </p:blipFill>
+        <p:spPr>
+          <a:xfrm>
+            <a:off x="6588472" y="3725305"/>
+            <a:ext cx="2367163" cy="2367163"/>
+          </a:xfrm>
+          <a:prstGeom prst="rect">
+            <a:avLst/>
+          </a:prstGeom>
+        </p:spPr>
+      </p:pic>
     </p:spTree>
     <p:extLst>
       <p:ext uri="{BB962C8B-B14F-4D97-AF65-F5344CB8AC3E}">
@@ -9621,7 +9721,20 @@
                 <a:effectLst/>
                 <a:latin typeface="+mj-lt"/>
               </a:rPr>
-              <a:t>Verfolgung von Containern während des Überseetransports GPS-Tracking</a:t>
+              <a:t>Verfolgung von Containern während des Überseetransports </a:t>
+            </a:r>
+          </a:p>
+          <a:p>
+            <a:pPr lvl="1" fontAlgn="base">
+              <a:buFont typeface="Arial" panose="020B0604020202020204" pitchFamily="34" charset="0"/>
+              <a:buChar char="•"/>
+            </a:pPr>
+            <a:r>
+              <a:rPr lang="de-DE" b="0" i="0" dirty="0">
+                <a:effectLst/>
+                <a:latin typeface="+mj-lt"/>
+              </a:rPr>
+              <a:t>GPS-Tracking</a:t>
             </a:r>
           </a:p>
           <a:p>
@@ -10452,7 +10565,7 @@
         </p:nvSpPr>
         <p:spPr>
           <a:xfrm>
-            <a:off x="6736771" y="2853672"/>
+            <a:off x="6696485" y="2858894"/>
             <a:ext cx="2300514" cy="400110"/>
           </a:xfrm>
           <a:prstGeom prst="rect">
@@ -10468,7 +10581,7 @@
           <a:p>
             <a:pPr lvl="1"/>
             <a:r>
-              <a:rPr lang="de-AT" sz="2000" u="sng">
+              <a:rPr lang="de-AT" sz="2000" u="sng" dirty="0">
                 <a:solidFill>
                   <a:schemeClr val="bg1"/>
                 </a:solidFill>
@@ -10507,7 +10620,7 @@
           <a:lstStyle/>
           <a:p>
             <a:r>
-              <a:rPr lang="de-AT" sz="2800" b="1" u="sng">
+              <a:rPr lang="de-AT" sz="2800" b="1" u="sng" dirty="0">
                 <a:solidFill>
                   <a:schemeClr val="bg1"/>
                 </a:solidFill>
@@ -10515,14 +10628,14 @@
               <a:t>Luca A. </a:t>
             </a:r>
             <a:r>
-              <a:rPr lang="de-AT" sz="2800" b="1" u="sng" err="1">
+              <a:rPr lang="de-AT" sz="2800" b="1" u="sng" dirty="0" err="1">
                 <a:solidFill>
                   <a:schemeClr val="bg1"/>
                 </a:solidFill>
               </a:rPr>
               <a:t>Gekle</a:t>
             </a:r>
-            <a:endParaRPr lang="de-AT" sz="2800" b="1" u="sng">
+            <a:endParaRPr lang="de-AT" sz="2800" b="1" u="sng" dirty="0">
               <a:solidFill>
                 <a:schemeClr val="bg1"/>
               </a:solidFill>
@@ -10560,14 +10673,14 @@
           <a:p>
             <a:pPr lvl="1"/>
             <a:r>
-              <a:rPr lang="de-AT" sz="2000" u="sng">
+              <a:rPr lang="de-AT" sz="2000" u="sng" dirty="0">
                 <a:solidFill>
                   <a:schemeClr val="bg1"/>
                 </a:solidFill>
               </a:rPr>
               <a:t>Webanwendung</a:t>
             </a:r>
-            <a:endParaRPr lang="de-AT" sz="1800" u="sng">
+            <a:endParaRPr lang="de-AT" sz="1800" u="sng" dirty="0">
               <a:solidFill>
                 <a:schemeClr val="bg1"/>
               </a:solidFill>
@@ -10604,14 +10717,14 @@
           <a:lstStyle/>
           <a:p>
             <a:r>
-              <a:rPr lang="de-AT" sz="2000" u="sng">
+              <a:rPr lang="de-AT" sz="2000" u="sng" dirty="0">
                 <a:solidFill>
                   <a:schemeClr val="bg1"/>
                 </a:solidFill>
               </a:rPr>
               <a:t>Positionsalgorithmus</a:t>
             </a:r>
-            <a:endParaRPr lang="en-US" u="sng"/>
+            <a:endParaRPr lang="en-US" u="sng" dirty="0"/>
           </a:p>
         </p:txBody>
       </p:sp>
@@ -10742,6 +10855,9 @@
                     <p:cTn id="3" fill="hold">
                       <p:stCondLst>
                         <p:cond delay="indefinite"/>
+                        <p:cond evt="onBegin" delay="0">
+                          <p:tn val="2"/>
+                        </p:cond>
                       </p:stCondLst>
                       <p:childTnLst>
                         <p:par>
@@ -10751,9 +10867,9 @@
                             </p:stCondLst>
                             <p:childTnLst>
                               <p:par>
-                                <p:cTn id="5" presetID="10" presetClass="entr" presetSubtype="0" fill="hold" nodeType="clickEffect">
+                                <p:cTn id="5" presetID="10" presetClass="entr" presetSubtype="0" fill="hold" nodeType="afterEffect">
                                   <p:stCondLst>
-                                    <p:cond delay="0"/>
+                                    <p:cond delay="250"/>
                                   </p:stCondLst>
                                   <p:childTnLst>
                                     <p:set>
@@ -10796,30 +10912,21 @@
                             </p:childTnLst>
                           </p:cTn>
                         </p:par>
-                      </p:childTnLst>
-                    </p:cTn>
-                  </p:par>
-                  <p:par>
-                    <p:cTn id="8" fill="hold">
-                      <p:stCondLst>
-                        <p:cond delay="indefinite"/>
-                      </p:stCondLst>
-                      <p:childTnLst>
                         <p:par>
-                          <p:cTn id="9" fill="hold">
+                          <p:cTn id="8" fill="hold">
                             <p:stCondLst>
-                              <p:cond delay="0"/>
+                              <p:cond delay="750"/>
                             </p:stCondLst>
                             <p:childTnLst>
                               <p:par>
-                                <p:cTn id="10" presetID="10" presetClass="entr" presetSubtype="0" fill="hold" nodeType="clickEffect">
+                                <p:cTn id="9" presetID="10" presetClass="entr" presetSubtype="0" fill="hold" nodeType="afterEffect">
                                   <p:stCondLst>
-                                    <p:cond delay="0"/>
+                                    <p:cond delay="250"/>
                                   </p:stCondLst>
                                   <p:childTnLst>
                                     <p:set>
                                       <p:cBhvr>
-                                        <p:cTn id="11" dur="1" fill="hold">
+                                        <p:cTn id="10" dur="1" fill="hold">
                                           <p:stCondLst>
                                             <p:cond delay="0"/>
                                           </p:stCondLst>
@@ -10841,7 +10948,7 @@
                                     </p:set>
                                     <p:animEffect transition="in" filter="fade">
                                       <p:cBhvr>
-                                        <p:cTn id="12" dur="500"/>
+                                        <p:cTn id="11" dur="500"/>
                                         <p:tgtEl>
                                           <p:spTgt spid="12">
                                             <p:txEl>
@@ -10858,20 +10965,20 @@
                           </p:cTn>
                         </p:par>
                         <p:par>
-                          <p:cTn id="13" fill="hold">
+                          <p:cTn id="12" fill="hold">
                             <p:stCondLst>
-                              <p:cond delay="500"/>
+                              <p:cond delay="1500"/>
                             </p:stCondLst>
                             <p:childTnLst>
                               <p:par>
-                                <p:cTn id="14" presetID="10" presetClass="entr" presetSubtype="0" fill="hold" nodeType="afterEffect">
+                                <p:cTn id="13" presetID="10" presetClass="entr" presetSubtype="0" fill="hold" nodeType="afterEffect">
                                   <p:stCondLst>
                                     <p:cond delay="750"/>
                                   </p:stCondLst>
                                   <p:childTnLst>
                                     <p:set>
                                       <p:cBhvr>
-                                        <p:cTn id="15" dur="1" fill="hold">
+                                        <p:cTn id="14" dur="1" fill="hold">
                                           <p:stCondLst>
                                             <p:cond delay="0"/>
                                           </p:stCondLst>
@@ -10893,7 +11000,7 @@
                                     </p:set>
                                     <p:animEffect transition="in" filter="fade">
                                       <p:cBhvr>
-                                        <p:cTn id="16" dur="500"/>
+                                        <p:cTn id="15" dur="500"/>
                                         <p:tgtEl>
                                           <p:spTgt spid="3">
                                             <p:txEl>
@@ -10910,20 +11017,20 @@
                           </p:cTn>
                         </p:par>
                         <p:par>
-                          <p:cTn id="17" fill="hold">
+                          <p:cTn id="16" fill="hold">
                             <p:stCondLst>
-                              <p:cond delay="1750"/>
+                              <p:cond delay="2750"/>
                             </p:stCondLst>
                             <p:childTnLst>
                               <p:par>
-                                <p:cTn id="18" presetID="10" presetClass="entr" presetSubtype="0" fill="hold" nodeType="afterEffect">
+                                <p:cTn id="17" presetID="10" presetClass="entr" presetSubtype="0" fill="hold" nodeType="afterEffect">
                                   <p:stCondLst>
                                     <p:cond delay="500"/>
                                   </p:stCondLst>
                                   <p:childTnLst>
                                     <p:set>
                                       <p:cBhvr>
-                                        <p:cTn id="19" dur="1" fill="hold">
+                                        <p:cTn id="18" dur="1" fill="hold">
                                           <p:stCondLst>
                                             <p:cond delay="0"/>
                                           </p:stCondLst>
@@ -10945,7 +11052,7 @@
                                     </p:set>
                                     <p:animEffect transition="in" filter="fade">
                                       <p:cBhvr>
-                                        <p:cTn id="20" dur="500"/>
+                                        <p:cTn id="19" dur="500"/>
                                         <p:tgtEl>
                                           <p:spTgt spid="14">
                                             <p:txEl>
@@ -10962,20 +11069,20 @@
                           </p:cTn>
                         </p:par>
                         <p:par>
-                          <p:cTn id="21" fill="hold">
+                          <p:cTn id="20" fill="hold">
                             <p:stCondLst>
-                              <p:cond delay="2750"/>
+                              <p:cond delay="3750"/>
                             </p:stCondLst>
                             <p:childTnLst>
                               <p:par>
-                                <p:cTn id="22" presetID="10" presetClass="entr" presetSubtype="0" fill="hold" nodeType="afterEffect">
+                                <p:cTn id="21" presetID="10" presetClass="entr" presetSubtype="0" fill="hold" nodeType="afterEffect">
                                   <p:stCondLst>
                                     <p:cond delay="250"/>
                                   </p:stCondLst>
                                   <p:childTnLst>
                                     <p:set>
                                       <p:cBhvr>
-                                        <p:cTn id="23" dur="1" fill="hold">
+                                        <p:cTn id="22" dur="1" fill="hold">
                                           <p:stCondLst>
                                             <p:cond delay="0"/>
                                           </p:stCondLst>
@@ -10993,7 +11100,7 @@
                                     </p:set>
                                     <p:animEffect transition="in" filter="fade">
                                       <p:cBhvr>
-                                        <p:cTn id="24" dur="1000"/>
+                                        <p:cTn id="23" dur="1000"/>
                                         <p:tgtEl>
                                           <p:spTgt spid="16"/>
                                         </p:tgtEl>
@@ -11064,7 +11171,7 @@
         </p:nvSpPr>
         <p:spPr>
           <a:xfrm>
-            <a:off x="-32619" y="-2178"/>
+            <a:off x="-32619" y="0"/>
             <a:ext cx="12257237" cy="6858000"/>
           </a:xfrm>
           <a:prstGeom prst="rect">
@@ -11100,14 +11207,11 @@
           <a:bodyPr rtlCol="0" anchor="ctr"/>
           <a:lstStyle/>
           <a:p>
-            <a:r>
-              <a:rPr lang="de-AT" sz="1800">
-                <a:solidFill>
-                  <a:schemeClr val="bg1"/>
-                </a:solidFill>
-              </a:rPr>
-              <a:t>Luca Alexander Gekle</a:t>
-            </a:r>
+            <a:endParaRPr lang="de-AT" sz="1800" dirty="0">
+              <a:solidFill>
+                <a:schemeClr val="bg1"/>
+              </a:solidFill>
+            </a:endParaRPr>
           </a:p>
         </p:txBody>
       </p:sp>
@@ -11214,7 +11318,54 @@
         </p:blipFill>
         <p:spPr bwMode="auto">
           <a:xfrm>
-            <a:off x="5312724" y="1588522"/>
+            <a:off x="5312724" y="1785166"/>
+            <a:ext cx="559134" cy="559134"/>
+          </a:xfrm>
+          <a:prstGeom prst="rect">
+            <a:avLst/>
+          </a:prstGeom>
+          <a:noFill/>
+          <a:extLst>
+            <a:ext uri="{909E8E84-426E-40DD-AFC4-6F175D3DCCD1}">
+              <a14:hiddenFill xmlns:a14="http://schemas.microsoft.com/office/drawing/2010/main">
+                <a:solidFill>
+                  <a:srgbClr val="FFFFFF"/>
+                </a:solidFill>
+              </a14:hiddenFill>
+            </a:ext>
+          </a:extLst>
+        </p:spPr>
+      </p:pic>
+      <p:pic>
+        <p:nvPicPr>
+          <p:cNvPr id="3" name="Picture 2" descr="NodeMCU ESP32 | Joy-IT">
+            <a:extLst>
+              <a:ext uri="{FF2B5EF4-FFF2-40B4-BE49-F238E27FC236}">
+                <a16:creationId xmlns:a16="http://schemas.microsoft.com/office/drawing/2014/main" id="{1D760FF0-D398-D889-5BE3-0519E62345AD}"/>
+              </a:ext>
+            </a:extLst>
+          </p:cNvPr>
+          <p:cNvPicPr>
+            <a:picLocks noChangeAspect="1" noChangeArrowheads="1"/>
+          </p:cNvPicPr>
+          <p:nvPr/>
+        </p:nvPicPr>
+        <p:blipFill>
+          <a:blip r:embed="rId3" cstate="print">
+            <a:extLst>
+              <a:ext uri="{28A0092B-C50C-407E-A947-70E740481C1C}">
+                <a14:useLocalDpi xmlns:a14="http://schemas.microsoft.com/office/drawing/2010/main" val="0"/>
+              </a:ext>
+            </a:extLst>
+          </a:blip>
+          <a:srcRect/>
+          <a:stretch>
+            <a:fillRect/>
+          </a:stretch>
+        </p:blipFill>
+        <p:spPr bwMode="auto">
+          <a:xfrm>
+            <a:off x="5033157" y="1792797"/>
             <a:ext cx="559134" cy="559134"/>
           </a:xfrm>
           <a:prstGeom prst="rect">
@@ -11262,7 +11413,7 @@
         </p:blipFill>
         <p:spPr>
           <a:xfrm>
-            <a:off x="-65238" y="4243"/>
+            <a:off x="-24294" y="200887"/>
             <a:ext cx="12257238" cy="6215588"/>
           </a:xfrm>
           <a:prstGeom prst="rect">
@@ -11284,8 +11435,8 @@
         </p:nvSpPr>
         <p:spPr>
           <a:xfrm>
-            <a:off x="4202226" y="4547416"/>
-            <a:ext cx="3164929" cy="400110"/>
+            <a:off x="4202226" y="4744060"/>
+            <a:ext cx="3465900" cy="523220"/>
           </a:xfrm>
           <a:prstGeom prst="rect">
             <a:avLst/>
@@ -11299,7 +11450,7 @@
           <a:lstStyle/>
           <a:p>
             <a:r>
-              <a:rPr lang="de-AT" sz="2000" b="1" u="sng">
+              <a:rPr lang="de-AT" sz="2800" b="1" u="sng" dirty="0">
                 <a:solidFill>
                   <a:schemeClr val="bg1"/>
                 </a:solidFill>
@@ -11323,7 +11474,7 @@
         </p:nvSpPr>
         <p:spPr>
           <a:xfrm>
-            <a:off x="2926369" y="1675665"/>
+            <a:off x="107273" y="1817230"/>
             <a:ext cx="1502142" cy="400110"/>
           </a:xfrm>
           <a:prstGeom prst="rect">
@@ -11338,14 +11489,14 @@
           <a:lstStyle/>
           <a:p>
             <a:r>
-              <a:rPr lang="de-AT" sz="2000">
+              <a:rPr lang="de-AT" sz="2000" u="sng" dirty="0">
                 <a:solidFill>
                   <a:schemeClr val="bg1"/>
                 </a:solidFill>
               </a:rPr>
               <a:t>Hardware</a:t>
             </a:r>
-            <a:endParaRPr lang="en-US"/>
+            <a:endParaRPr lang="en-US" u="sng" dirty="0"/>
           </a:p>
         </p:txBody>
       </p:sp>
@@ -11363,7 +11514,7 @@
         </p:nvSpPr>
         <p:spPr>
           <a:xfrm>
-            <a:off x="5592292" y="2147656"/>
+            <a:off x="5544671" y="1872309"/>
             <a:ext cx="1410087" cy="400110"/>
           </a:xfrm>
           <a:prstGeom prst="rect">
@@ -11378,14 +11529,14 @@
           <a:lstStyle/>
           <a:p>
             <a:r>
-              <a:rPr lang="de-AT" sz="2000">
+              <a:rPr lang="de-AT" sz="2000" u="sng" dirty="0">
                 <a:solidFill>
                   <a:schemeClr val="bg1"/>
                 </a:solidFill>
               </a:rPr>
               <a:t>Sensorik</a:t>
             </a:r>
-            <a:endParaRPr lang="en-US"/>
+            <a:endParaRPr lang="en-US" u="sng" dirty="0"/>
           </a:p>
         </p:txBody>
       </p:sp>
@@ -11403,8 +11554,8 @@
         </p:nvSpPr>
         <p:spPr>
           <a:xfrm>
-            <a:off x="-65239" y="2511872"/>
-            <a:ext cx="7897570" cy="892552"/>
+            <a:off x="2771285" y="2298134"/>
+            <a:ext cx="1527760" cy="892552"/>
           </a:xfrm>
           <a:prstGeom prst="rect">
             <a:avLst/>
@@ -11418,7 +11569,7 @@
           <a:lstStyle/>
           <a:p>
             <a:r>
-              <a:rPr lang="de-AT" sz="2000" dirty="0">
+              <a:rPr lang="de-AT" sz="2000" u="sng" dirty="0">
                 <a:solidFill>
                   <a:schemeClr val="bg1"/>
                 </a:solidFill>
@@ -11427,7 +11578,7 @@
             </a:r>
           </a:p>
           <a:p>
-            <a:endParaRPr lang="de-AT" sz="1200" dirty="0">
+            <a:endParaRPr lang="de-AT" sz="1200" u="sng" dirty="0">
               <a:solidFill>
                 <a:schemeClr val="bg1"/>
               </a:solidFill>
@@ -11435,14 +11586,14 @@
           </a:p>
           <a:p>
             <a:r>
-              <a:rPr lang="de-AT" sz="2000" dirty="0" err="1">
+              <a:rPr lang="de-AT" sz="2000" u="sng" dirty="0" err="1">
                 <a:solidFill>
                   <a:schemeClr val="bg1"/>
                 </a:solidFill>
               </a:rPr>
               <a:t>übertragung</a:t>
             </a:r>
-            <a:endParaRPr lang="en-US" dirty="0"/>
+            <a:endParaRPr lang="en-US" u="sng" dirty="0"/>
           </a:p>
         </p:txBody>
       </p:sp>
@@ -11583,7 +11734,7 @@
                                           </p:stCondLst>
                                         </p:cTn>
                                         <p:tgtEl>
-                                          <p:spTgt spid="17"/>
+                                          <p:spTgt spid="2"/>
                                         </p:tgtEl>
                                         <p:attrNameLst>
                                           <p:attrName>style.visibility</p:attrName>
@@ -11619,7 +11770,7 @@
                                           </p:stCondLst>
                                         </p:cTn>
                                         <p:tgtEl>
-                                          <p:spTgt spid="2"/>
+                                          <p:spTgt spid="17"/>
                                         </p:tgtEl>
                                         <p:attrNameLst>
                                           <p:attrName>style.visibility</p:attrName>
@@ -11700,7 +11851,7 @@
         </p:nvSpPr>
         <p:spPr>
           <a:xfrm>
-            <a:off x="-65238" y="0"/>
+            <a:off x="-32619" y="0"/>
             <a:ext cx="12257237" cy="6858000"/>
           </a:xfrm>
           <a:prstGeom prst="rect">
@@ -11736,14 +11887,11 @@
           <a:bodyPr rtlCol="0" anchor="ctr"/>
           <a:lstStyle/>
           <a:p>
-            <a:r>
-              <a:rPr lang="de-AT" sz="1800">
-                <a:solidFill>
-                  <a:schemeClr val="bg1"/>
-                </a:solidFill>
-              </a:rPr>
-              <a:t>Luca Alexander Gekle</a:t>
-            </a:r>
+            <a:endParaRPr lang="de-AT" sz="1800" dirty="0">
+              <a:solidFill>
+                <a:schemeClr val="bg1"/>
+              </a:solidFill>
+            </a:endParaRPr>
           </a:p>
         </p:txBody>
       </p:sp>
@@ -11823,44 +11971,6 @@
       </p:sp>
       <p:pic>
         <p:nvPicPr>
-          <p:cNvPr id="6" name="Grafik 5">
-            <a:extLst>
-              <a:ext uri="{FF2B5EF4-FFF2-40B4-BE49-F238E27FC236}">
-                <a16:creationId xmlns:a16="http://schemas.microsoft.com/office/drawing/2014/main" id="{835BFC3E-6502-D5D2-F643-8AE4DCE6143B}"/>
-              </a:ext>
-            </a:extLst>
-          </p:cNvPr>
-          <p:cNvPicPr>
-            <a:picLocks noChangeAspect="1"/>
-          </p:cNvPicPr>
-          <p:nvPr/>
-        </p:nvPicPr>
-        <p:blipFill rotWithShape="1">
-          <a:blip r:embed="rId3">
-            <a:extLst>
-              <a:ext uri="{28A0092B-C50C-407E-A947-70E740481C1C}">
-                <a14:useLocalDpi xmlns:a14="http://schemas.microsoft.com/office/drawing/2010/main" val="0"/>
-              </a:ext>
-              <a:ext uri="{96DAC541-7B7A-43D3-8B79-37D633B846F1}">
-                <asvg:svgBlip xmlns:asvg="http://schemas.microsoft.com/office/drawing/2016/SVG/main" r:embed="rId4"/>
-              </a:ext>
-            </a:extLst>
-          </a:blip>
-          <a:srcRect l="38203" t="12999" r="30542" b="-2628"/>
-          <a:stretch/>
-        </p:blipFill>
-        <p:spPr>
-          <a:xfrm>
-            <a:off x="-65238" y="4243"/>
-            <a:ext cx="12257238" cy="6215588"/>
-          </a:xfrm>
-          <a:prstGeom prst="rect">
-            <a:avLst/>
-          </a:prstGeom>
-        </p:spPr>
-      </p:pic>
-      <p:pic>
-        <p:nvPicPr>
           <p:cNvPr id="2050" name="Picture 2" descr="NodeMCU ESP32 | Joy-IT">
             <a:extLst>
               <a:ext uri="{FF2B5EF4-FFF2-40B4-BE49-F238E27FC236}">
@@ -11874,7 +11984,7 @@
           <p:nvPr/>
         </p:nvPicPr>
         <p:blipFill>
-          <a:blip r:embed="rId5" cstate="print">
+          <a:blip r:embed="rId3" cstate="print">
             <a:extLst>
               <a:ext uri="{28A0092B-C50C-407E-A947-70E740481C1C}">
                 <a14:useLocalDpi xmlns:a14="http://schemas.microsoft.com/office/drawing/2010/main" val="0"/>
@@ -11888,7 +11998,7 @@
         </p:blipFill>
         <p:spPr bwMode="auto">
           <a:xfrm>
-            <a:off x="7222669" y="1588522"/>
+            <a:off x="5312724" y="1785166"/>
             <a:ext cx="559134" cy="559134"/>
           </a:xfrm>
           <a:prstGeom prst="rect">
@@ -11906,6 +12016,91 @@
           </a:extLst>
         </p:spPr>
       </p:pic>
+      <p:pic>
+        <p:nvPicPr>
+          <p:cNvPr id="3" name="Picture 2" descr="NodeMCU ESP32 | Joy-IT">
+            <a:extLst>
+              <a:ext uri="{FF2B5EF4-FFF2-40B4-BE49-F238E27FC236}">
+                <a16:creationId xmlns:a16="http://schemas.microsoft.com/office/drawing/2014/main" id="{1D760FF0-D398-D889-5BE3-0519E62345AD}"/>
+              </a:ext>
+            </a:extLst>
+          </p:cNvPr>
+          <p:cNvPicPr>
+            <a:picLocks noChangeAspect="1" noChangeArrowheads="1"/>
+          </p:cNvPicPr>
+          <p:nvPr/>
+        </p:nvPicPr>
+        <p:blipFill>
+          <a:blip r:embed="rId3" cstate="print">
+            <a:extLst>
+              <a:ext uri="{28A0092B-C50C-407E-A947-70E740481C1C}">
+                <a14:useLocalDpi xmlns:a14="http://schemas.microsoft.com/office/drawing/2010/main" val="0"/>
+              </a:ext>
+            </a:extLst>
+          </a:blip>
+          <a:srcRect/>
+          <a:stretch>
+            <a:fillRect/>
+          </a:stretch>
+        </p:blipFill>
+        <p:spPr bwMode="auto">
+          <a:xfrm>
+            <a:off x="5033157" y="1792797"/>
+            <a:ext cx="559134" cy="559134"/>
+          </a:xfrm>
+          <a:prstGeom prst="rect">
+            <a:avLst/>
+          </a:prstGeom>
+          <a:noFill/>
+          <a:extLst>
+            <a:ext uri="{909E8E84-426E-40DD-AFC4-6F175D3DCCD1}">
+              <a14:hiddenFill xmlns:a14="http://schemas.microsoft.com/office/drawing/2010/main">
+                <a:solidFill>
+                  <a:srgbClr val="FFFFFF"/>
+                </a:solidFill>
+              </a14:hiddenFill>
+            </a:ext>
+          </a:extLst>
+        </p:spPr>
+      </p:pic>
+      <p:pic>
+        <p:nvPicPr>
+          <p:cNvPr id="6" name="Grafik 5">
+            <a:extLst>
+              <a:ext uri="{FF2B5EF4-FFF2-40B4-BE49-F238E27FC236}">
+                <a16:creationId xmlns:a16="http://schemas.microsoft.com/office/drawing/2014/main" id="{835BFC3E-6502-D5D2-F643-8AE4DCE6143B}"/>
+              </a:ext>
+            </a:extLst>
+          </p:cNvPr>
+          <p:cNvPicPr>
+            <a:picLocks noChangeAspect="1"/>
+          </p:cNvPicPr>
+          <p:nvPr/>
+        </p:nvPicPr>
+        <p:blipFill rotWithShape="1">
+          <a:blip r:embed="rId4">
+            <a:extLst>
+              <a:ext uri="{28A0092B-C50C-407E-A947-70E740481C1C}">
+                <a14:useLocalDpi xmlns:a14="http://schemas.microsoft.com/office/drawing/2010/main" val="0"/>
+              </a:ext>
+              <a:ext uri="{96DAC541-7B7A-43D3-8B79-37D633B846F1}">
+                <asvg:svgBlip xmlns:asvg="http://schemas.microsoft.com/office/drawing/2016/SVG/main" r:embed="rId5"/>
+              </a:ext>
+            </a:extLst>
+          </a:blip>
+          <a:srcRect l="38203" t="12999" r="30542" b="-2628"/>
+          <a:stretch/>
+        </p:blipFill>
+        <p:spPr>
+          <a:xfrm>
+            <a:off x="-24294" y="200887"/>
+            <a:ext cx="12257238" cy="6215588"/>
+          </a:xfrm>
+          <a:prstGeom prst="rect">
+            <a:avLst/>
+          </a:prstGeom>
+        </p:spPr>
+      </p:pic>
       <p:sp>
         <p:nvSpPr>
           <p:cNvPr id="11" name="Textfeld 10">
@@ -11920,8 +12115,8 @@
         </p:nvSpPr>
         <p:spPr>
           <a:xfrm>
-            <a:off x="4202226" y="4547416"/>
-            <a:ext cx="3300010" cy="400110"/>
+            <a:off x="4202226" y="4744060"/>
+            <a:ext cx="3465900" cy="523220"/>
           </a:xfrm>
           <a:prstGeom prst="rect">
             <a:avLst/>
@@ -11935,7 +12130,7 @@
           <a:lstStyle/>
           <a:p>
             <a:r>
-              <a:rPr lang="de-AT" sz="2000" b="1" u="sng">
+              <a:rPr lang="de-AT" sz="2800" b="1" u="sng" dirty="0">
                 <a:solidFill>
                   <a:schemeClr val="bg1"/>
                 </a:solidFill>
@@ -11959,7 +12154,7 @@
         </p:nvSpPr>
         <p:spPr>
           <a:xfrm>
-            <a:off x="2926369" y="1675665"/>
+            <a:off x="107273" y="1817230"/>
             <a:ext cx="1502142" cy="400110"/>
           </a:xfrm>
           <a:prstGeom prst="rect">
@@ -11974,14 +12169,14 @@
           <a:lstStyle/>
           <a:p>
             <a:r>
-              <a:rPr lang="de-AT" sz="2000">
+              <a:rPr lang="de-AT" sz="2000" u="sng" dirty="0">
                 <a:solidFill>
                   <a:schemeClr val="bg1"/>
                 </a:solidFill>
               </a:rPr>
               <a:t>Hardware</a:t>
             </a:r>
-            <a:endParaRPr lang="en-US"/>
+            <a:endParaRPr lang="en-US" u="sng" dirty="0"/>
           </a:p>
         </p:txBody>
       </p:sp>
@@ -11999,7 +12194,7 @@
         </p:nvSpPr>
         <p:spPr>
           <a:xfrm>
-            <a:off x="5592292" y="2147656"/>
+            <a:off x="5544671" y="1872309"/>
             <a:ext cx="1410087" cy="400110"/>
           </a:xfrm>
           <a:prstGeom prst="rect">
@@ -12014,14 +12209,14 @@
           <a:lstStyle/>
           <a:p>
             <a:r>
-              <a:rPr lang="de-AT" sz="2000">
+              <a:rPr lang="de-AT" sz="2000" u="sng" dirty="0">
                 <a:solidFill>
                   <a:schemeClr val="bg1"/>
                 </a:solidFill>
               </a:rPr>
               <a:t>Sensorik</a:t>
             </a:r>
-            <a:endParaRPr lang="en-US"/>
+            <a:endParaRPr lang="en-US" u="sng" dirty="0"/>
           </a:p>
         </p:txBody>
       </p:sp>
@@ -12030,7 +12225,7 @@
           <p:cNvPr id="2" name="Textfeld 1">
             <a:extLst>
               <a:ext uri="{FF2B5EF4-FFF2-40B4-BE49-F238E27FC236}">
-                <a16:creationId xmlns:a16="http://schemas.microsoft.com/office/drawing/2014/main" id="{8A826894-CE15-F64D-E27D-89974107FF57}"/>
+                <a16:creationId xmlns:a16="http://schemas.microsoft.com/office/drawing/2014/main" id="{86EA9456-8BBA-55A9-EC46-FB2166AC4C50}"/>
               </a:ext>
             </a:extLst>
           </p:cNvPr>
@@ -12039,8 +12234,8 @@
         </p:nvSpPr>
         <p:spPr>
           <a:xfrm>
-            <a:off x="-65239" y="2511872"/>
-            <a:ext cx="7897570" cy="892552"/>
+            <a:off x="2771285" y="2298134"/>
+            <a:ext cx="1527760" cy="892552"/>
           </a:xfrm>
           <a:prstGeom prst="rect">
             <a:avLst/>
@@ -12054,7 +12249,7 @@
           <a:lstStyle/>
           <a:p>
             <a:r>
-              <a:rPr lang="de-AT" sz="2000" dirty="0">
+              <a:rPr lang="de-AT" sz="2000" u="sng" dirty="0">
                 <a:solidFill>
                   <a:schemeClr val="bg1"/>
                 </a:solidFill>
@@ -12063,7 +12258,7 @@
             </a:r>
           </a:p>
           <a:p>
-            <a:endParaRPr lang="de-AT" sz="1200" dirty="0">
+            <a:endParaRPr lang="de-AT" sz="1200" u="sng" dirty="0">
               <a:solidFill>
                 <a:schemeClr val="bg1"/>
               </a:solidFill>
@@ -12071,21 +12266,68 @@
           </a:p>
           <a:p>
             <a:r>
-              <a:rPr lang="de-AT" sz="2000" dirty="0" err="1">
+              <a:rPr lang="de-AT" sz="2000" u="sng" dirty="0" err="1">
                 <a:solidFill>
                   <a:schemeClr val="bg1"/>
                 </a:solidFill>
               </a:rPr>
               <a:t>übertragung</a:t>
             </a:r>
-            <a:endParaRPr lang="en-US" dirty="0"/>
-          </a:p>
-        </p:txBody>
-      </p:sp>
+            <a:endParaRPr lang="en-US" u="sng" dirty="0"/>
+          </a:p>
+        </p:txBody>
+      </p:sp>
+      <p:pic>
+        <p:nvPicPr>
+          <p:cNvPr id="8" name="Picture 2" descr="NodeMCU ESP32 | Joy-IT">
+            <a:extLst>
+              <a:ext uri="{FF2B5EF4-FFF2-40B4-BE49-F238E27FC236}">
+                <a16:creationId xmlns:a16="http://schemas.microsoft.com/office/drawing/2014/main" id="{1D760FF0-D398-D889-5BE3-0519E62345AD}"/>
+              </a:ext>
+            </a:extLst>
+          </p:cNvPr>
+          <p:cNvPicPr>
+            <a:picLocks noChangeAspect="1" noChangeArrowheads="1"/>
+          </p:cNvPicPr>
+          <p:nvPr/>
+        </p:nvPicPr>
+        <p:blipFill>
+          <a:blip r:embed="rId3" cstate="print">
+            <a:extLst>
+              <a:ext uri="{28A0092B-C50C-407E-A947-70E740481C1C}">
+                <a14:useLocalDpi xmlns:a14="http://schemas.microsoft.com/office/drawing/2010/main" val="0"/>
+              </a:ext>
+            </a:extLst>
+          </a:blip>
+          <a:srcRect/>
+          <a:stretch>
+            <a:fillRect/>
+          </a:stretch>
+        </p:blipFill>
+        <p:spPr bwMode="auto">
+          <a:xfrm>
+            <a:off x="7186705" y="1785166"/>
+            <a:ext cx="559134" cy="559134"/>
+          </a:xfrm>
+          <a:prstGeom prst="rect">
+            <a:avLst/>
+          </a:prstGeom>
+          <a:noFill/>
+          <a:extLst>
+            <a:ext uri="{909E8E84-426E-40DD-AFC4-6F175D3DCCD1}">
+              <a14:hiddenFill xmlns:a14="http://schemas.microsoft.com/office/drawing/2010/main">
+                <a:solidFill>
+                  <a:srgbClr val="FFFFFF"/>
+                </a:solidFill>
+              </a14:hiddenFill>
+            </a:ext>
+          </a:extLst>
+        </p:spPr>
+      </p:pic>
     </p:spTree>
     <p:extLst>
       <p:ext uri="{BB962C8B-B14F-4D97-AF65-F5344CB8AC3E}">
-        <p14:creationId xmlns:p14="http://schemas.microsoft.com/office/powerpoint/2010/main" val="398900337"/>
+        <p14:creationId xmlns:p14="http://schemas.microsoft.com/office/powerpoint/2010/main" val="1261891472"/>
       </p:ext>
     </p:extLst>
   </p:cSld>
@@ -12094,12 +12336,12 @@
   </p:clrMapOvr>
   <mc:AlternateContent xmlns:mc="http://schemas.openxmlformats.org/markup-compatibility/2006" xmlns:p159="http://schemas.microsoft.com/office/powerpoint/2015/09/main">
     <mc:Choice Requires="p159">
-      <p:transition xmlns:p14="http://schemas.microsoft.com/office/powerpoint/2010/main" spd="slow" p14:dur="2000" advClick="0" advTm="1000">
+      <p:transition xmlns:p14="http://schemas.microsoft.com/office/powerpoint/2010/main" spd="slow" p14:dur="1750" advClick="0" advTm="500">
         <p159:morph option="byObject"/>
       </p:transition>
     </mc:Choice>
     <mc:Fallback xmlns="">
-      <p:transition spd="slow" advClick="0" advTm="1000">
+      <p:transition spd="slow" advClick="0" advTm="500">
         <p:fade/>
       </p:transition>
     </mc:Fallback>
@@ -12138,7 +12380,7 @@
         </p:nvSpPr>
         <p:spPr>
           <a:xfrm>
-            <a:off x="-65238" y="0"/>
+            <a:off x="-32619" y="0"/>
             <a:ext cx="12257237" cy="6858000"/>
           </a:xfrm>
           <a:prstGeom prst="rect">
@@ -12174,14 +12416,11 @@
           <a:bodyPr rtlCol="0" anchor="ctr"/>
           <a:lstStyle/>
           <a:p>
-            <a:r>
-              <a:rPr lang="de-AT" sz="1800">
-                <a:solidFill>
-                  <a:schemeClr val="bg1"/>
-                </a:solidFill>
-              </a:rPr>
-              <a:t>Luca Alexander Gekle</a:t>
-            </a:r>
+            <a:endParaRPr lang="de-AT" sz="1800" dirty="0">
+              <a:solidFill>
+                <a:schemeClr val="bg1"/>
+              </a:solidFill>
+            </a:endParaRPr>
           </a:p>
         </p:txBody>
       </p:sp>
@@ -12261,44 +12500,6 @@
       </p:sp>
       <p:pic>
         <p:nvPicPr>
-          <p:cNvPr id="6" name="Grafik 5">
-            <a:extLst>
-              <a:ext uri="{FF2B5EF4-FFF2-40B4-BE49-F238E27FC236}">
-                <a16:creationId xmlns:a16="http://schemas.microsoft.com/office/drawing/2014/main" id="{835BFC3E-6502-D5D2-F643-8AE4DCE6143B}"/>
-              </a:ext>
-            </a:extLst>
-          </p:cNvPr>
-          <p:cNvPicPr>
-            <a:picLocks noChangeAspect="1"/>
-          </p:cNvPicPr>
-          <p:nvPr/>
-        </p:nvPicPr>
-        <p:blipFill rotWithShape="1">
-          <a:blip r:embed="rId3">
-            <a:extLst>
-              <a:ext uri="{28A0092B-C50C-407E-A947-70E740481C1C}">
-                <a14:useLocalDpi xmlns:a14="http://schemas.microsoft.com/office/drawing/2010/main" val="0"/>
-              </a:ext>
-              <a:ext uri="{96DAC541-7B7A-43D3-8B79-37D633B846F1}">
-                <asvg:svgBlip xmlns:asvg="http://schemas.microsoft.com/office/drawing/2016/SVG/main" r:embed="rId4"/>
-              </a:ext>
-            </a:extLst>
-          </a:blip>
-          <a:srcRect l="38203" t="12999" r="30542" b="-2628"/>
-          <a:stretch/>
-        </p:blipFill>
-        <p:spPr>
-          <a:xfrm>
-            <a:off x="-65238" y="4243"/>
-            <a:ext cx="12257238" cy="6215588"/>
-          </a:xfrm>
-          <a:prstGeom prst="rect">
-            <a:avLst/>
-          </a:prstGeom>
-        </p:spPr>
-      </p:pic>
-      <p:pic>
-        <p:nvPicPr>
           <p:cNvPr id="2050" name="Picture 2" descr="NodeMCU ESP32 | Joy-IT">
             <a:extLst>
               <a:ext uri="{FF2B5EF4-FFF2-40B4-BE49-F238E27FC236}">
@@ -12312,7 +12513,7 @@
           <p:nvPr/>
         </p:nvPicPr>
         <p:blipFill>
-          <a:blip r:embed="rId5" cstate="print">
+          <a:blip r:embed="rId3" cstate="print">
             <a:extLst>
               <a:ext uri="{28A0092B-C50C-407E-A947-70E740481C1C}">
                 <a14:useLocalDpi xmlns:a14="http://schemas.microsoft.com/office/drawing/2010/main" val="0"/>
@@ -12326,8 +12527,8 @@
         </p:blipFill>
         <p:spPr bwMode="auto">
           <a:xfrm>
-            <a:off x="7821825" y="1616757"/>
-            <a:ext cx="2190340" cy="2190340"/>
+            <a:off x="5312724" y="1785166"/>
+            <a:ext cx="559134" cy="559134"/>
           </a:xfrm>
           <a:prstGeom prst="rect">
             <a:avLst/>
@@ -12344,6 +12545,91 @@
           </a:extLst>
         </p:spPr>
       </p:pic>
+      <p:pic>
+        <p:nvPicPr>
+          <p:cNvPr id="3" name="Picture 2" descr="NodeMCU ESP32 | Joy-IT">
+            <a:extLst>
+              <a:ext uri="{FF2B5EF4-FFF2-40B4-BE49-F238E27FC236}">
+                <a16:creationId xmlns:a16="http://schemas.microsoft.com/office/drawing/2014/main" id="{1D760FF0-D398-D889-5BE3-0519E62345AD}"/>
+              </a:ext>
+            </a:extLst>
+          </p:cNvPr>
+          <p:cNvPicPr>
+            <a:picLocks noChangeAspect="1" noChangeArrowheads="1"/>
+          </p:cNvPicPr>
+          <p:nvPr/>
+        </p:nvPicPr>
+        <p:blipFill>
+          <a:blip r:embed="rId3" cstate="print">
+            <a:extLst>
+              <a:ext uri="{28A0092B-C50C-407E-A947-70E740481C1C}">
+                <a14:useLocalDpi xmlns:a14="http://schemas.microsoft.com/office/drawing/2010/main" val="0"/>
+              </a:ext>
+            </a:extLst>
+          </a:blip>
+          <a:srcRect/>
+          <a:stretch>
+            <a:fillRect/>
+          </a:stretch>
+        </p:blipFill>
+        <p:spPr bwMode="auto">
+          <a:xfrm>
+            <a:off x="5033157" y="1792797"/>
+            <a:ext cx="559134" cy="559134"/>
+          </a:xfrm>
+          <a:prstGeom prst="rect">
+            <a:avLst/>
+          </a:prstGeom>
+          <a:noFill/>
+          <a:extLst>
+            <a:ext uri="{909E8E84-426E-40DD-AFC4-6F175D3DCCD1}">
+              <a14:hiddenFill xmlns:a14="http://schemas.microsoft.com/office/drawing/2010/main">
+                <a:solidFill>
+                  <a:srgbClr val="FFFFFF"/>
+                </a:solidFill>
+              </a14:hiddenFill>
+            </a:ext>
+          </a:extLst>
+        </p:spPr>
+      </p:pic>
+      <p:pic>
+        <p:nvPicPr>
+          <p:cNvPr id="6" name="Grafik 5">
+            <a:extLst>
+              <a:ext uri="{FF2B5EF4-FFF2-40B4-BE49-F238E27FC236}">
+                <a16:creationId xmlns:a16="http://schemas.microsoft.com/office/drawing/2014/main" id="{835BFC3E-6502-D5D2-F643-8AE4DCE6143B}"/>
+              </a:ext>
+            </a:extLst>
+          </p:cNvPr>
+          <p:cNvPicPr>
+            <a:picLocks noChangeAspect="1"/>
+          </p:cNvPicPr>
+          <p:nvPr/>
+        </p:nvPicPr>
+        <p:blipFill rotWithShape="1">
+          <a:blip r:embed="rId4">
+            <a:extLst>
+              <a:ext uri="{28A0092B-C50C-407E-A947-70E740481C1C}">
+                <a14:useLocalDpi xmlns:a14="http://schemas.microsoft.com/office/drawing/2010/main" val="0"/>
+              </a:ext>
+              <a:ext uri="{96DAC541-7B7A-43D3-8B79-37D633B846F1}">
+                <asvg:svgBlip xmlns:asvg="http://schemas.microsoft.com/office/drawing/2016/SVG/main" r:embed="rId5"/>
+              </a:ext>
+            </a:extLst>
+          </a:blip>
+          <a:srcRect l="38203" t="12999" r="30542" b="-2628"/>
+          <a:stretch/>
+        </p:blipFill>
+        <p:spPr>
+          <a:xfrm>
+            <a:off x="-24294" y="200887"/>
+            <a:ext cx="12257238" cy="6215588"/>
+          </a:xfrm>
+          <a:prstGeom prst="rect">
+            <a:avLst/>
+          </a:prstGeom>
+        </p:spPr>
+      </p:pic>
       <p:sp>
         <p:nvSpPr>
           <p:cNvPr id="11" name="Textfeld 10">
@@ -12358,8 +12644,8 @@
         </p:nvSpPr>
         <p:spPr>
           <a:xfrm>
-            <a:off x="4202226" y="4547416"/>
-            <a:ext cx="2800153" cy="400110"/>
+            <a:off x="4202226" y="4744060"/>
+            <a:ext cx="3465900" cy="523220"/>
           </a:xfrm>
           <a:prstGeom prst="rect">
             <a:avLst/>
@@ -12373,7 +12659,7 @@
           <a:lstStyle/>
           <a:p>
             <a:r>
-              <a:rPr lang="de-AT" sz="2000" b="1" u="sng">
+              <a:rPr lang="de-AT" sz="2800" b="1" u="sng" dirty="0">
                 <a:solidFill>
                   <a:schemeClr val="bg1"/>
                 </a:solidFill>
@@ -12397,7 +12683,7 @@
         </p:nvSpPr>
         <p:spPr>
           <a:xfrm>
-            <a:off x="2926369" y="1675665"/>
+            <a:off x="107273" y="1817230"/>
             <a:ext cx="1502142" cy="400110"/>
           </a:xfrm>
           <a:prstGeom prst="rect">
@@ -12412,14 +12698,14 @@
           <a:lstStyle/>
           <a:p>
             <a:r>
-              <a:rPr lang="de-AT" sz="2000">
+              <a:rPr lang="de-AT" sz="2000" u="sng" dirty="0">
                 <a:solidFill>
                   <a:schemeClr val="bg1"/>
                 </a:solidFill>
               </a:rPr>
               <a:t>Hardware</a:t>
             </a:r>
-            <a:endParaRPr lang="en-US"/>
+            <a:endParaRPr lang="en-US" u="sng" dirty="0"/>
           </a:p>
         </p:txBody>
       </p:sp>
@@ -12437,7 +12723,7 @@
         </p:nvSpPr>
         <p:spPr>
           <a:xfrm>
-            <a:off x="5592292" y="2147656"/>
+            <a:off x="5544671" y="1872309"/>
             <a:ext cx="1410087" cy="400110"/>
           </a:xfrm>
           <a:prstGeom prst="rect">
@@ -12452,23 +12738,23 @@
           <a:lstStyle/>
           <a:p>
             <a:r>
-              <a:rPr lang="de-AT" sz="2000">
+              <a:rPr lang="de-AT" sz="2000" u="sng" dirty="0">
                 <a:solidFill>
                   <a:schemeClr val="bg1"/>
                 </a:solidFill>
               </a:rPr>
               <a:t>Sensorik</a:t>
             </a:r>
-            <a:endParaRPr lang="en-US"/>
-          </a:p>
-        </p:txBody>
-      </p:sp>
-      <p:sp>
-        <p:nvSpPr>
-          <p:cNvPr id="19" name="Textfeld 18">
-            <a:extLst>
-              <a:ext uri="{FF2B5EF4-FFF2-40B4-BE49-F238E27FC236}">
-                <a16:creationId xmlns:a16="http://schemas.microsoft.com/office/drawing/2014/main" id="{51CB33F9-8673-CAEE-CB6E-2AACC970E80E}"/>
+            <a:endParaRPr lang="en-US" u="sng" dirty="0"/>
+          </a:p>
+        </p:txBody>
+      </p:sp>
+      <p:sp>
+        <p:nvSpPr>
+          <p:cNvPr id="2" name="Textfeld 1">
+            <a:extLst>
+              <a:ext uri="{FF2B5EF4-FFF2-40B4-BE49-F238E27FC236}">
+                <a16:creationId xmlns:a16="http://schemas.microsoft.com/office/drawing/2014/main" id="{86EA9456-8BBA-55A9-EC46-FB2166AC4C50}"/>
               </a:ext>
             </a:extLst>
           </p:cNvPr>
@@ -12477,8 +12763,8 @@
         </p:nvSpPr>
         <p:spPr>
           <a:xfrm>
-            <a:off x="-65239" y="2511872"/>
-            <a:ext cx="7897570" cy="892552"/>
+            <a:off x="2771285" y="2298134"/>
+            <a:ext cx="1527760" cy="892552"/>
           </a:xfrm>
           <a:prstGeom prst="rect">
             <a:avLst/>
@@ -12492,7 +12778,7 @@
           <a:lstStyle/>
           <a:p>
             <a:r>
-              <a:rPr lang="de-AT" sz="2000" dirty="0">
+              <a:rPr lang="de-AT" sz="2000" u="sng" dirty="0">
                 <a:solidFill>
                   <a:schemeClr val="bg1"/>
                 </a:solidFill>
@@ -12501,7 +12787,7 @@
             </a:r>
           </a:p>
           <a:p>
-            <a:endParaRPr lang="de-AT" sz="1200" dirty="0">
+            <a:endParaRPr lang="de-AT" sz="1200" u="sng" dirty="0">
               <a:solidFill>
                 <a:schemeClr val="bg1"/>
               </a:solidFill>
@@ -12509,21 +12795,68 @@
           </a:p>
           <a:p>
             <a:r>
-              <a:rPr lang="de-AT" sz="2000" dirty="0" err="1">
+              <a:rPr lang="de-AT" sz="2000" u="sng" dirty="0" err="1">
                 <a:solidFill>
                   <a:schemeClr val="bg1"/>
                 </a:solidFill>
               </a:rPr>
               <a:t>übertragung</a:t>
             </a:r>
-            <a:endParaRPr lang="en-US" dirty="0"/>
-          </a:p>
-        </p:txBody>
-      </p:sp>
+            <a:endParaRPr lang="en-US" u="sng" dirty="0"/>
+          </a:p>
+        </p:txBody>
+      </p:sp>
+      <p:pic>
+        <p:nvPicPr>
+          <p:cNvPr id="8" name="Picture 2" descr="NodeMCU ESP32 | Joy-IT">
+            <a:extLst>
+              <a:ext uri="{FF2B5EF4-FFF2-40B4-BE49-F238E27FC236}">
+                <a16:creationId xmlns:a16="http://schemas.microsoft.com/office/drawing/2014/main" id="{7F089D39-6A03-EF6E-B437-F074B2A84608}"/>
+              </a:ext>
+            </a:extLst>
+          </p:cNvPr>
+          <p:cNvPicPr>
+            <a:picLocks noChangeAspect="1" noChangeArrowheads="1"/>
+          </p:cNvPicPr>
+          <p:nvPr/>
+        </p:nvPicPr>
+        <p:blipFill>
+          <a:blip r:embed="rId3" cstate="print">
+            <a:extLst>
+              <a:ext uri="{28A0092B-C50C-407E-A947-70E740481C1C}">
+                <a14:useLocalDpi xmlns:a14="http://schemas.microsoft.com/office/drawing/2010/main" val="0"/>
+              </a:ext>
+            </a:extLst>
+          </a:blip>
+          <a:srcRect/>
+          <a:stretch>
+            <a:fillRect/>
+          </a:stretch>
+        </p:blipFill>
+        <p:spPr bwMode="auto">
+          <a:xfrm>
+            <a:off x="7892957" y="1759602"/>
+            <a:ext cx="1969615" cy="1969615"/>
+          </a:xfrm>
+          <a:prstGeom prst="rect">
+            <a:avLst/>
+          </a:prstGeom>
+          <a:noFill/>
+          <a:extLst>
+            <a:ext uri="{909E8E84-426E-40DD-AFC4-6F175D3DCCD1}">
+              <a14:hiddenFill xmlns:a14="http://schemas.microsoft.com/office/drawing/2010/main">
+                <a:solidFill>
+                  <a:srgbClr val="FFFFFF"/>
+                </a:solidFill>
+              </a14:hiddenFill>
+            </a:ext>
+          </a:extLst>
+        </p:spPr>
+      </p:pic>
     </p:spTree>
     <p:extLst>
       <p:ext uri="{BB962C8B-B14F-4D97-AF65-F5344CB8AC3E}">
-        <p14:creationId xmlns:p14="http://schemas.microsoft.com/office/powerpoint/2010/main" val="1531555268"/>
+        <p14:creationId xmlns:p14="http://schemas.microsoft.com/office/powerpoint/2010/main" val="457281821"/>
       </p:ext>
     </p:extLst>
   </p:cSld>
@@ -12532,12 +12865,12 @@
   </p:clrMapOvr>
   <mc:AlternateContent xmlns:mc="http://schemas.openxmlformats.org/markup-compatibility/2006" xmlns:p159="http://schemas.microsoft.com/office/powerpoint/2015/09/main">
     <mc:Choice Requires="p159">
-      <p:transition xmlns:p14="http://schemas.microsoft.com/office/powerpoint/2010/main" spd="slow" p14:dur="2000">
+      <p:transition xmlns:p14="http://schemas.microsoft.com/office/powerpoint/2010/main" spd="slow" p14:dur="2000" advClick="0">
         <p159:morph option="byObject"/>
       </p:transition>
     </mc:Choice>
     <mc:Fallback xmlns="">
-      <p:transition spd="slow">
+      <p:transition spd="slow" advClick="0">
         <p:fade/>
       </p:transition>
     </mc:Fallback>

</xml_diff>